<commit_message>
Some basic changes to the presentation.
</commit_message>
<xml_diff>
--- a/Presentation.pptx
+++ b/Presentation.pptx
@@ -10,10 +10,13 @@
     <p:sldId id="258" r:id="rId4"/>
     <p:sldId id="259" r:id="rId5"/>
     <p:sldId id="264" r:id="rId6"/>
-    <p:sldId id="260" r:id="rId7"/>
-    <p:sldId id="261" r:id="rId8"/>
-    <p:sldId id="262" r:id="rId9"/>
-    <p:sldId id="263" r:id="rId10"/>
+    <p:sldId id="265" r:id="rId7"/>
+    <p:sldId id="260" r:id="rId8"/>
+    <p:sldId id="261" r:id="rId9"/>
+    <p:sldId id="262" r:id="rId10"/>
+    <p:sldId id="263" r:id="rId11"/>
+    <p:sldId id="266" r:id="rId12"/>
+    <p:sldId id="267" r:id="rId13"/>
   </p:sldIdLst>
   <p:sldSz cx="9144000" cy="6858000" type="screen4x3"/>
   <p:notesSz cx="6858000" cy="9144000"/>
@@ -309,7 +312,7 @@
             <a:fld id="{451DEABC-D766-4322-8E78-B830FAE35C72}" type="datetime4">
               <a:rPr lang="en-US" smtClean="0"/>
               <a:pPr/>
-              <a:t>April 23, 2012</a:t>
+              <a:t>April 28, 2012</a:t>
             </a:fld>
             <a:endParaRPr lang="en-US" dirty="0"/>
           </a:p>
@@ -463,6 +466,14 @@
   <p:clrMapOvr>
     <a:masterClrMapping/>
   </p:clrMapOvr>
+  <mc:AlternateContent xmlns:mc="http://schemas.openxmlformats.org/markup-compatibility/2006" xmlns:p14="http://schemas.microsoft.com/office/powerpoint/2010/main">
+    <mc:Choice Requires="p14">
+      <p:transition p14:dur="0"/>
+    </mc:Choice>
+    <mc:Fallback xmlns="">
+      <p:transition xmlns:p14="http://schemas.microsoft.com/office/powerpoint/2010/main"/>
+    </mc:Fallback>
+  </mc:AlternateContent>
 </p:sldLayout>
 </file>
 
@@ -576,7 +587,7 @@
             <a:fld id="{F3131F9E-604E-4343-9F29-EF72E8231CAD}" type="datetime4">
               <a:rPr lang="en-US" smtClean="0"/>
               <a:pPr/>
-              <a:t>April 23, 2012</a:t>
+              <a:t>April 28, 2012</a:t>
             </a:fld>
             <a:endParaRPr lang="en-US"/>
           </a:p>
@@ -630,6 +641,14 @@
   <p:clrMapOvr>
     <a:masterClrMapping/>
   </p:clrMapOvr>
+  <mc:AlternateContent xmlns:mc="http://schemas.openxmlformats.org/markup-compatibility/2006" xmlns:p14="http://schemas.microsoft.com/office/powerpoint/2010/main">
+    <mc:Choice Requires="p14">
+      <p:transition p14:dur="0"/>
+    </mc:Choice>
+    <mc:Fallback xmlns="">
+      <p:transition xmlns:p14="http://schemas.microsoft.com/office/powerpoint/2010/main"/>
+    </mc:Fallback>
+  </mc:AlternateContent>
 </p:sldLayout>
 </file>
 
@@ -753,7 +772,7 @@
             <a:fld id="{34A8E1CE-37F8-4102-8DF9-852A0A51F293}" type="datetime4">
               <a:rPr lang="en-US" smtClean="0"/>
               <a:pPr/>
-              <a:t>April 23, 2012</a:t>
+              <a:t>April 28, 2012</a:t>
             </a:fld>
             <a:endParaRPr lang="en-US"/>
           </a:p>
@@ -807,6 +826,14 @@
   <p:clrMapOvr>
     <a:masterClrMapping/>
   </p:clrMapOvr>
+  <mc:AlternateContent xmlns:mc="http://schemas.openxmlformats.org/markup-compatibility/2006" xmlns:p14="http://schemas.microsoft.com/office/powerpoint/2010/main">
+    <mc:Choice Requires="p14">
+      <p:transition p14:dur="0"/>
+    </mc:Choice>
+    <mc:Fallback xmlns="">
+      <p:transition xmlns:p14="http://schemas.microsoft.com/office/powerpoint/2010/main"/>
+    </mc:Fallback>
+  </mc:AlternateContent>
 </p:sldLayout>
 </file>
 
@@ -920,7 +947,7 @@
             <a:fld id="{93333F43-3E86-47E4-BFBB-2476D384E1C6}" type="datetime4">
               <a:rPr lang="en-US" smtClean="0"/>
               <a:pPr/>
-              <a:t>April 23, 2012</a:t>
+              <a:t>April 28, 2012</a:t>
             </a:fld>
             <a:endParaRPr lang="en-US"/>
           </a:p>
@@ -974,6 +1001,14 @@
   <p:clrMapOvr>
     <a:masterClrMapping/>
   </p:clrMapOvr>
+  <mc:AlternateContent xmlns:mc="http://schemas.openxmlformats.org/markup-compatibility/2006" xmlns:p14="http://schemas.microsoft.com/office/powerpoint/2010/main">
+    <mc:Choice Requires="p14">
+      <p:transition p14:dur="0"/>
+    </mc:Choice>
+    <mc:Fallback xmlns="">
+      <p:transition xmlns:p14="http://schemas.microsoft.com/office/powerpoint/2010/main"/>
+    </mc:Fallback>
+  </mc:AlternateContent>
 </p:sldLayout>
 </file>
 
@@ -1171,7 +1206,7 @@
             <a:fld id="{751663BA-01FC-4367-B6F3-ABB2645D55F1}" type="datetime4">
               <a:rPr lang="en-US" smtClean="0"/>
               <a:pPr/>
-              <a:t>April 23, 2012</a:t>
+              <a:t>April 28, 2012</a:t>
             </a:fld>
             <a:endParaRPr lang="en-US" dirty="0"/>
           </a:p>
@@ -1225,6 +1260,14 @@
   <p:clrMapOvr>
     <a:masterClrMapping/>
   </p:clrMapOvr>
+  <mc:AlternateContent xmlns:mc="http://schemas.openxmlformats.org/markup-compatibility/2006" xmlns:p14="http://schemas.microsoft.com/office/powerpoint/2010/main">
+    <mc:Choice Requires="p14">
+      <p:transition p14:dur="0"/>
+    </mc:Choice>
+    <mc:Fallback xmlns="">
+      <p:transition xmlns:p14="http://schemas.microsoft.com/office/powerpoint/2010/main"/>
+    </mc:Fallback>
+  </mc:AlternateContent>
 </p:sldLayout>
 </file>
 
@@ -1456,7 +1499,7 @@
             <a:fld id="{79B19C71-EC74-44AF-B27E-FC7DC3C3A61D}" type="datetime4">
               <a:rPr lang="en-US" smtClean="0"/>
               <a:pPr/>
-              <a:t>April 23, 2012</a:t>
+              <a:t>April 28, 2012</a:t>
             </a:fld>
             <a:endParaRPr lang="en-US"/>
           </a:p>
@@ -1510,6 +1553,14 @@
   <p:clrMapOvr>
     <a:masterClrMapping/>
   </p:clrMapOvr>
+  <mc:AlternateContent xmlns:mc="http://schemas.openxmlformats.org/markup-compatibility/2006" xmlns:p14="http://schemas.microsoft.com/office/powerpoint/2010/main">
+    <mc:Choice Requires="p14">
+      <p:transition p14:dur="0"/>
+    </mc:Choice>
+    <mc:Fallback xmlns="">
+      <p:transition xmlns:p14="http://schemas.microsoft.com/office/powerpoint/2010/main"/>
+    </mc:Fallback>
+  </mc:AlternateContent>
 </p:sldLayout>
 </file>
 
@@ -1897,7 +1948,7 @@
             <a:fld id="{6A5CDA29-3CBE-48EA-92AE-A996835462BA}" type="datetime4">
               <a:rPr lang="en-US" smtClean="0"/>
               <a:pPr/>
-              <a:t>April 23, 2012</a:t>
+              <a:t>April 28, 2012</a:t>
             </a:fld>
             <a:endParaRPr lang="en-US"/>
           </a:p>
@@ -1951,6 +2002,14 @@
   <p:clrMapOvr>
     <a:masterClrMapping/>
   </p:clrMapOvr>
+  <mc:AlternateContent xmlns:mc="http://schemas.openxmlformats.org/markup-compatibility/2006" xmlns:p14="http://schemas.microsoft.com/office/powerpoint/2010/main">
+    <mc:Choice Requires="p14">
+      <p:transition p14:dur="0"/>
+    </mc:Choice>
+    <mc:Fallback xmlns="">
+      <p:transition xmlns:p14="http://schemas.microsoft.com/office/powerpoint/2010/main"/>
+    </mc:Fallback>
+  </mc:AlternateContent>
 </p:sldLayout>
 </file>
 
@@ -2012,7 +2071,7 @@
             <a:fld id="{E29EC054-3869-4501-B163-1BBFDE8DCE04}" type="datetime4">
               <a:rPr lang="en-US" smtClean="0"/>
               <a:pPr/>
-              <a:t>April 23, 2012</a:t>
+              <a:t>April 28, 2012</a:t>
             </a:fld>
             <a:endParaRPr lang="en-US"/>
           </a:p>
@@ -2066,6 +2125,14 @@
   <p:clrMapOvr>
     <a:masterClrMapping/>
   </p:clrMapOvr>
+  <mc:AlternateContent xmlns:mc="http://schemas.openxmlformats.org/markup-compatibility/2006" xmlns:p14="http://schemas.microsoft.com/office/powerpoint/2010/main">
+    <mc:Choice Requires="p14">
+      <p:transition p14:dur="0"/>
+    </mc:Choice>
+    <mc:Fallback xmlns="">
+      <p:transition xmlns:p14="http://schemas.microsoft.com/office/powerpoint/2010/main"/>
+    </mc:Fallback>
+  </mc:AlternateContent>
 </p:sldLayout>
 </file>
 
@@ -2104,7 +2171,7 @@
             <a:fld id="{0A63D831-56C1-49CF-8EF7-8B9A98402BCD}" type="datetime4">
               <a:rPr lang="en-US" smtClean="0"/>
               <a:pPr/>
-              <a:t>April 23, 2012</a:t>
+              <a:t>April 28, 2012</a:t>
             </a:fld>
             <a:endParaRPr lang="en-US"/>
           </a:p>
@@ -2158,6 +2225,14 @@
   <p:clrMapOvr>
     <a:masterClrMapping/>
   </p:clrMapOvr>
+  <mc:AlternateContent xmlns:mc="http://schemas.openxmlformats.org/markup-compatibility/2006" xmlns:p14="http://schemas.microsoft.com/office/powerpoint/2010/main">
+    <mc:Choice Requires="p14">
+      <p:transition p14:dur="0"/>
+    </mc:Choice>
+    <mc:Fallback xmlns="">
+      <p:transition xmlns:p14="http://schemas.microsoft.com/office/powerpoint/2010/main"/>
+    </mc:Fallback>
+  </mc:AlternateContent>
 </p:sldLayout>
 </file>
 
@@ -2348,7 +2423,7 @@
             <a:fld id="{6EAD5615-7F4F-4584-84D5-CC95918C321F}" type="datetime4">
               <a:rPr lang="en-US" smtClean="0"/>
               <a:pPr/>
-              <a:t>April 23, 2012</a:t>
+              <a:t>April 28, 2012</a:t>
             </a:fld>
             <a:endParaRPr lang="en-US"/>
           </a:p>
@@ -2425,6 +2500,14 @@
   <p:clrMapOvr>
     <a:masterClrMapping/>
   </p:clrMapOvr>
+  <mc:AlternateContent xmlns:mc="http://schemas.openxmlformats.org/markup-compatibility/2006" xmlns:p14="http://schemas.microsoft.com/office/powerpoint/2010/main">
+    <mc:Choice Requires="p14">
+      <p:transition p14:dur="0"/>
+    </mc:Choice>
+    <mc:Fallback xmlns="">
+      <p:transition xmlns:p14="http://schemas.microsoft.com/office/powerpoint/2010/main"/>
+    </mc:Fallback>
+  </mc:AlternateContent>
 </p:sldLayout>
 </file>
 
@@ -2644,7 +2727,7 @@
             <a:fld id="{76EEA923-9BEE-48CE-9F28-5B525F399BAD}" type="datetime4">
               <a:rPr lang="en-US" smtClean="0"/>
               <a:pPr/>
-              <a:t>April 23, 2012</a:t>
+              <a:t>April 28, 2012</a:t>
             </a:fld>
             <a:endParaRPr lang="en-US"/>
           </a:p>
@@ -2786,6 +2869,14 @@
   <p:clrMapOvr>
     <a:masterClrMapping/>
   </p:clrMapOvr>
+  <mc:AlternateContent xmlns:mc="http://schemas.openxmlformats.org/markup-compatibility/2006" xmlns:p14="http://schemas.microsoft.com/office/powerpoint/2010/main">
+    <mc:Choice Requires="p14">
+      <p:transition p14:dur="0"/>
+    </mc:Choice>
+    <mc:Fallback xmlns="">
+      <p:transition xmlns:p14="http://schemas.microsoft.com/office/powerpoint/2010/main"/>
+    </mc:Fallback>
+  </mc:AlternateContent>
 </p:sldLayout>
 </file>
 
@@ -2940,7 +3031,7 @@
             <a:fld id="{17D0EFEE-2756-4A20-BF2A-63F0A94F99AC}" type="datetime4">
               <a:rPr lang="en-US" smtClean="0"/>
               <a:pPr/>
-              <a:t>April 23, 2012</a:t>
+              <a:t>April 28, 2012</a:t>
             </a:fld>
             <a:endParaRPr lang="en-US" dirty="0"/>
           </a:p>
@@ -3129,6 +3220,14 @@
     <p:sldLayoutId id="2147483922" r:id="rId10"/>
     <p:sldLayoutId id="2147483923" r:id="rId11"/>
   </p:sldLayoutIdLst>
+  <mc:AlternateContent xmlns:mc="http://schemas.openxmlformats.org/markup-compatibility/2006" xmlns:p14="http://schemas.microsoft.com/office/powerpoint/2010/main">
+    <mc:Choice Requires="p14">
+      <p:transition p14:dur="0"/>
+    </mc:Choice>
+    <mc:Fallback xmlns="">
+      <p:transition xmlns:p14="http://schemas.microsoft.com/office/powerpoint/2010/main"/>
+    </mc:Fallback>
+  </mc:AlternateContent>
   <p:hf sldNum="0" hdr="0" ftr="0" dt="0"/>
   <p:txStyles>
     <p:titleStyle>
@@ -3444,7 +3543,11 @@
           <a:p>
             <a:r>
               <a:rPr lang="en-US" dirty="0" smtClean="0"/>
-              <a:t>MESSAGE PASSING WITH ERLANG</a:t>
+              <a:t>MESSAGE </a:t>
+            </a:r>
+            <a:r>
+              <a:rPr lang="en-US" dirty="0" smtClean="0"/>
+              <a:t>PASSING WITH ERLANG</a:t>
             </a:r>
             <a:endParaRPr lang="en-US" dirty="0"/>
           </a:p>
@@ -3491,11 +3594,7 @@
             </a:br>
             <a:r>
               <a:rPr lang="en-US" dirty="0"/>
-              <a:t>Matthew Mancuso</a:t>
-            </a:r>
-            <a:r>
-              <a:rPr lang="en-US" dirty="0"/>
-              <a:t> </a:t>
+              <a:t>Matthew Mancuso </a:t>
             </a:r>
           </a:p>
         </p:txBody>
@@ -3510,11 +3609,11 @@
   <p:clrMapOvr>
     <a:masterClrMapping/>
   </p:clrMapOvr>
-  <mc:AlternateContent xmlns:mc="http://schemas.openxmlformats.org/markup-compatibility/2006">
-    <mc:Choice xmlns:p14="http://schemas.microsoft.com/office/powerpoint/2010/main" Requires="p14">
+  <mc:AlternateContent xmlns:mc="http://schemas.openxmlformats.org/markup-compatibility/2006" xmlns:p14="http://schemas.microsoft.com/office/powerpoint/2010/main">
+    <mc:Choice Requires="p14">
       <p:transition p14:dur="0"/>
     </mc:Choice>
-    <mc:Fallback>
+    <mc:Fallback xmlns="">
       <p:transition xmlns:p14="http://schemas.microsoft.com/office/powerpoint/2010/main"/>
     </mc:Fallback>
   </mc:AlternateContent>
@@ -3525,6 +3624,596 @@
       </p:par>
     </p:tnLst>
   </p:timing>
+</p:sld>
+</file>
+
+<file path=ppt/slides/slide10.xml><?xml version="1.0" encoding="utf-8"?>
+<p:sld xmlns:a="http://schemas.openxmlformats.org/drawingml/2006/main" xmlns:r="http://schemas.openxmlformats.org/officeDocument/2006/relationships" xmlns:p="http://schemas.openxmlformats.org/presentationml/2006/main">
+  <p:cSld>
+    <p:spTree>
+      <p:nvGrpSpPr>
+        <p:cNvPr id="1" name=""/>
+        <p:cNvGrpSpPr/>
+        <p:nvPr/>
+      </p:nvGrpSpPr>
+      <p:grpSpPr>
+        <a:xfrm>
+          <a:off x="0" y="0"/>
+          <a:ext cx="0" cy="0"/>
+          <a:chOff x="0" y="0"/>
+          <a:chExt cx="0" cy="0"/>
+        </a:xfrm>
+      </p:grpSpPr>
+      <p:sp>
+        <p:nvSpPr>
+          <p:cNvPr id="2" name="Title 1"/>
+          <p:cNvSpPr>
+            <a:spLocks noGrp="1"/>
+          </p:cNvSpPr>
+          <p:nvPr>
+            <p:ph type="title"/>
+          </p:nvPr>
+        </p:nvSpPr>
+        <p:spPr/>
+        <p:txBody>
+          <a:bodyPr/>
+          <a:lstStyle/>
+          <a:p>
+            <a:r>
+              <a:rPr lang="en-US" dirty="0" smtClean="0"/>
+              <a:t>Tuple Space</a:t>
+            </a:r>
+            <a:endParaRPr lang="en-US" dirty="0"/>
+          </a:p>
+        </p:txBody>
+      </p:sp>
+      <p:sp>
+        <p:nvSpPr>
+          <p:cNvPr id="3" name="Content Placeholder 2"/>
+          <p:cNvSpPr>
+            <a:spLocks noGrp="1"/>
+          </p:cNvSpPr>
+          <p:nvPr>
+            <p:ph idx="1"/>
+          </p:nvPr>
+        </p:nvSpPr>
+        <p:spPr/>
+        <p:txBody>
+          <a:bodyPr>
+            <a:normAutofit/>
+          </a:bodyPr>
+          <a:lstStyle/>
+          <a:p>
+            <a:pPr marL="342900" indent="-342900">
+              <a:buFont typeface="Arial"/>
+              <a:buChar char="•"/>
+            </a:pPr>
+            <a:r>
+              <a:rPr lang="en-US" sz="2500" dirty="0" smtClean="0">
+                <a:latin typeface="Calibri"/>
+                <a:cs typeface="Calibri"/>
+              </a:rPr>
+              <a:t>A safe, shared data space for threads</a:t>
+            </a:r>
+          </a:p>
+          <a:p>
+            <a:pPr marL="342900" indent="-342900">
+              <a:buFont typeface="Arial"/>
+              <a:buChar char="•"/>
+            </a:pPr>
+            <a:r>
+              <a:rPr lang="en-US" sz="2500" dirty="0" smtClean="0">
+                <a:latin typeface="Calibri"/>
+                <a:cs typeface="Calibri"/>
+              </a:rPr>
+              <a:t>Producer/consumer model</a:t>
+            </a:r>
+          </a:p>
+          <a:p>
+            <a:pPr marL="342900" indent="-342900">
+              <a:buFont typeface="Arial"/>
+              <a:buChar char="•"/>
+            </a:pPr>
+            <a:r>
+              <a:rPr lang="en-US" sz="2500" dirty="0" smtClean="0">
+                <a:latin typeface="Calibri"/>
+                <a:cs typeface="Calibri"/>
+              </a:rPr>
+              <a:t>Actors can add/remove elements atomically</a:t>
+            </a:r>
+          </a:p>
+          <a:p>
+            <a:pPr marL="342900" indent="-342900">
+              <a:buFont typeface="Arial"/>
+              <a:buChar char="•"/>
+            </a:pPr>
+            <a:r>
+              <a:rPr lang="en-US" sz="2500" dirty="0" smtClean="0">
+                <a:latin typeface="Calibri"/>
+                <a:cs typeface="Calibri"/>
+              </a:rPr>
+              <a:t>Guarantee no element can be removed twice</a:t>
+            </a:r>
+          </a:p>
+          <a:p>
+            <a:pPr marL="342900" indent="-342900">
+              <a:buFont typeface="Arial"/>
+              <a:buChar char="•"/>
+            </a:pPr>
+            <a:endParaRPr lang="en-US" sz="2500" dirty="0">
+              <a:latin typeface="Calibri"/>
+              <a:cs typeface="Calibri"/>
+            </a:endParaRPr>
+          </a:p>
+        </p:txBody>
+      </p:sp>
+    </p:spTree>
+    <p:extLst>
+      <p:ext uri="{BB962C8B-B14F-4D97-AF65-F5344CB8AC3E}">
+        <p14:creationId xmlns:p14="http://schemas.microsoft.com/office/powerpoint/2010/main" val="3109331382"/>
+      </p:ext>
+    </p:extLst>
+  </p:cSld>
+  <p:clrMapOvr>
+    <a:masterClrMapping/>
+  </p:clrMapOvr>
+  <mc:AlternateContent xmlns:mc="http://schemas.openxmlformats.org/markup-compatibility/2006" xmlns:p14="http://schemas.microsoft.com/office/powerpoint/2010/main">
+    <mc:Choice Requires="p14">
+      <p:transition p14:dur="0"/>
+    </mc:Choice>
+    <mc:Fallback xmlns="">
+      <p:transition xmlns:p14="http://schemas.microsoft.com/office/powerpoint/2010/main"/>
+    </mc:Fallback>
+  </mc:AlternateContent>
+</p:sld>
+</file>
+
+<file path=ppt/slides/slide11.xml><?xml version="1.0" encoding="utf-8"?>
+<p:sld xmlns:a="http://schemas.openxmlformats.org/drawingml/2006/main" xmlns:r="http://schemas.openxmlformats.org/officeDocument/2006/relationships" xmlns:p="http://schemas.openxmlformats.org/presentationml/2006/main">
+  <p:cSld>
+    <p:spTree>
+      <p:nvGrpSpPr>
+        <p:cNvPr id="1" name=""/>
+        <p:cNvGrpSpPr/>
+        <p:nvPr/>
+      </p:nvGrpSpPr>
+      <p:grpSpPr>
+        <a:xfrm>
+          <a:off x="0" y="0"/>
+          <a:ext cx="0" cy="0"/>
+          <a:chOff x="0" y="0"/>
+          <a:chExt cx="0" cy="0"/>
+        </a:xfrm>
+      </p:grpSpPr>
+      <p:sp>
+        <p:nvSpPr>
+          <p:cNvPr id="2" name="Title 1"/>
+          <p:cNvSpPr>
+            <a:spLocks noGrp="1"/>
+          </p:cNvSpPr>
+          <p:nvPr>
+            <p:ph type="title"/>
+          </p:nvPr>
+        </p:nvSpPr>
+        <p:spPr/>
+        <p:txBody>
+          <a:bodyPr/>
+          <a:lstStyle/>
+          <a:p>
+            <a:r>
+              <a:rPr lang="en-US" dirty="0" smtClean="0"/>
+              <a:t>Implementations</a:t>
+            </a:r>
+            <a:endParaRPr lang="en-US" dirty="0"/>
+          </a:p>
+        </p:txBody>
+      </p:sp>
+      <p:sp>
+        <p:nvSpPr>
+          <p:cNvPr id="3" name="Content Placeholder 2"/>
+          <p:cNvSpPr>
+            <a:spLocks noGrp="1"/>
+          </p:cNvSpPr>
+          <p:nvPr>
+            <p:ph idx="1"/>
+          </p:nvPr>
+        </p:nvSpPr>
+        <p:spPr/>
+        <p:txBody>
+          <a:bodyPr/>
+          <a:lstStyle/>
+          <a:p>
+            <a:pPr marL="342900" indent="-342900">
+              <a:buFont typeface="Arial"/>
+              <a:buChar char="•"/>
+            </a:pPr>
+            <a:r>
+              <a:rPr lang="en-US" sz="2500" dirty="0" smtClean="0">
+                <a:latin typeface="Calibri"/>
+                <a:cs typeface="Calibri"/>
+              </a:rPr>
+              <a:t>Basic</a:t>
+            </a:r>
+          </a:p>
+          <a:p>
+            <a:pPr marL="800100" lvl="1" indent="-342900">
+              <a:buFont typeface="Arial"/>
+              <a:buChar char="•"/>
+            </a:pPr>
+            <a:r>
+              <a:rPr lang="en-US" sz="2500" dirty="0" smtClean="0">
+                <a:latin typeface="Calibri"/>
+                <a:cs typeface="Calibri"/>
+              </a:rPr>
+              <a:t>Uses list that gets recursively redefined</a:t>
+            </a:r>
+          </a:p>
+          <a:p>
+            <a:pPr marL="800100" lvl="1" indent="-342900">
+              <a:buFont typeface="Arial"/>
+              <a:buChar char="•"/>
+            </a:pPr>
+            <a:r>
+              <a:rPr lang="en-US" sz="2500" dirty="0" smtClean="0">
+                <a:latin typeface="Calibri"/>
+                <a:cs typeface="Calibri"/>
+              </a:rPr>
+              <a:t>Mutual Exclusion guaranteed by message passing </a:t>
+            </a:r>
+          </a:p>
+          <a:p>
+            <a:pPr marL="800100" lvl="1" indent="-342900">
+              <a:buFont typeface="Arial"/>
+              <a:buChar char="•"/>
+            </a:pPr>
+            <a:r>
+              <a:rPr lang="en-US" sz="2500" dirty="0" smtClean="0">
+                <a:latin typeface="Calibri"/>
+                <a:cs typeface="Calibri"/>
+              </a:rPr>
+              <a:t>Processed asynchronously, excluding destructive reads</a:t>
+            </a:r>
+          </a:p>
+          <a:p>
+            <a:pPr marL="342900" indent="-342900">
+              <a:buFont typeface="Arial"/>
+              <a:buChar char="•"/>
+            </a:pPr>
+            <a:r>
+              <a:rPr lang="en-US" sz="2500" dirty="0" err="1" smtClean="0">
+                <a:latin typeface="Calibri"/>
+                <a:cs typeface="Calibri"/>
+              </a:rPr>
+              <a:t>Erlang</a:t>
+            </a:r>
+            <a:r>
+              <a:rPr lang="en-US" sz="2500" dirty="0" smtClean="0">
+                <a:latin typeface="Calibri"/>
+                <a:cs typeface="Calibri"/>
+              </a:rPr>
+              <a:t> Table Space Version</a:t>
+            </a:r>
+          </a:p>
+          <a:p>
+            <a:pPr marL="800100" lvl="1" indent="-342900">
+              <a:buFont typeface="Arial"/>
+              <a:buChar char="•"/>
+            </a:pPr>
+            <a:r>
+              <a:rPr lang="en-US" sz="2500" dirty="0" smtClean="0">
+                <a:latin typeface="Calibri"/>
+                <a:cs typeface="Calibri"/>
+              </a:rPr>
+              <a:t>Uses a build in </a:t>
+            </a:r>
+            <a:r>
+              <a:rPr lang="en-US" sz="2500" dirty="0" err="1" smtClean="0">
+                <a:latin typeface="Calibri"/>
+                <a:cs typeface="Calibri"/>
+              </a:rPr>
+              <a:t>Erlang</a:t>
+            </a:r>
+            <a:r>
+              <a:rPr lang="en-US" sz="2500" dirty="0" smtClean="0">
+                <a:latin typeface="Calibri"/>
+                <a:cs typeface="Calibri"/>
+              </a:rPr>
+              <a:t> Data Structure</a:t>
+            </a:r>
+          </a:p>
+          <a:p>
+            <a:pPr marL="800100" lvl="1" indent="-342900">
+              <a:buFont typeface="Arial"/>
+              <a:buChar char="•"/>
+            </a:pPr>
+            <a:r>
+              <a:rPr lang="en-US" sz="2500" dirty="0" smtClean="0">
+                <a:latin typeface="Calibri"/>
+                <a:cs typeface="Calibri"/>
+              </a:rPr>
+              <a:t>Uses </a:t>
+            </a:r>
+            <a:r>
+              <a:rPr lang="en-US" sz="2500" dirty="0" err="1" smtClean="0">
+                <a:latin typeface="Calibri"/>
+                <a:cs typeface="Calibri"/>
+              </a:rPr>
+              <a:t>hashtable</a:t>
+            </a:r>
+            <a:r>
+              <a:rPr lang="en-US" sz="2500" dirty="0" smtClean="0">
+                <a:latin typeface="Calibri"/>
+                <a:cs typeface="Calibri"/>
+              </a:rPr>
+              <a:t> as opposed to list internally</a:t>
+            </a:r>
+          </a:p>
+          <a:p>
+            <a:pPr marL="800100" lvl="1" indent="-342900">
+              <a:buFont typeface="Arial"/>
+              <a:buChar char="•"/>
+            </a:pPr>
+            <a:endParaRPr lang="en-US" dirty="0"/>
+          </a:p>
+        </p:txBody>
+      </p:sp>
+    </p:spTree>
+    <p:extLst>
+      <p:ext uri="{BB962C8B-B14F-4D97-AF65-F5344CB8AC3E}">
+        <p14:creationId xmlns:p14="http://schemas.microsoft.com/office/powerpoint/2010/main" val="16444299"/>
+      </p:ext>
+    </p:extLst>
+  </p:cSld>
+  <p:clrMapOvr>
+    <a:masterClrMapping/>
+  </p:clrMapOvr>
+  <mc:AlternateContent xmlns:mc="http://schemas.openxmlformats.org/markup-compatibility/2006" xmlns:p14="http://schemas.microsoft.com/office/powerpoint/2010/main">
+    <mc:Choice Requires="p14">
+      <p:transition p14:dur="0"/>
+    </mc:Choice>
+    <mc:Fallback xmlns="">
+      <p:transition xmlns:p14="http://schemas.microsoft.com/office/powerpoint/2010/main"/>
+    </mc:Fallback>
+  </mc:AlternateContent>
+</p:sld>
+</file>
+
+<file path=ppt/slides/slide12.xml><?xml version="1.0" encoding="utf-8"?>
+<p:sld xmlns:a="http://schemas.openxmlformats.org/drawingml/2006/main" xmlns:r="http://schemas.openxmlformats.org/officeDocument/2006/relationships" xmlns:p="http://schemas.openxmlformats.org/presentationml/2006/main">
+  <p:cSld>
+    <p:spTree>
+      <p:nvGrpSpPr>
+        <p:cNvPr id="1" name=""/>
+        <p:cNvGrpSpPr/>
+        <p:nvPr/>
+      </p:nvGrpSpPr>
+      <p:grpSpPr>
+        <a:xfrm>
+          <a:off x="0" y="0"/>
+          <a:ext cx="0" cy="0"/>
+          <a:chOff x="0" y="0"/>
+          <a:chExt cx="0" cy="0"/>
+        </a:xfrm>
+      </p:grpSpPr>
+      <p:sp>
+        <p:nvSpPr>
+          <p:cNvPr id="2" name="Title 1"/>
+          <p:cNvSpPr>
+            <a:spLocks noGrp="1"/>
+          </p:cNvSpPr>
+          <p:nvPr>
+            <p:ph type="title"/>
+          </p:nvPr>
+        </p:nvSpPr>
+        <p:spPr/>
+        <p:txBody>
+          <a:bodyPr/>
+          <a:lstStyle/>
+          <a:p>
+            <a:r>
+              <a:rPr lang="en-US" dirty="0" err="1" smtClean="0"/>
+              <a:t>Erlang</a:t>
+            </a:r>
+            <a:r>
+              <a:rPr lang="en-US" dirty="0" smtClean="0"/>
+              <a:t> Table Space</a:t>
+            </a:r>
+            <a:endParaRPr lang="en-US" dirty="0"/>
+          </a:p>
+        </p:txBody>
+      </p:sp>
+      <p:sp>
+        <p:nvSpPr>
+          <p:cNvPr id="3" name="Content Placeholder 2"/>
+          <p:cNvSpPr>
+            <a:spLocks noGrp="1"/>
+          </p:cNvSpPr>
+          <p:nvPr>
+            <p:ph idx="1"/>
+          </p:nvPr>
+        </p:nvSpPr>
+        <p:spPr/>
+        <p:txBody>
+          <a:bodyPr/>
+          <a:lstStyle/>
+          <a:p>
+            <a:pPr marL="342900" indent="-342900">
+              <a:buFont typeface="Arial"/>
+              <a:buChar char="•"/>
+            </a:pPr>
+            <a:r>
+              <a:rPr lang="en-US" sz="2500" dirty="0" smtClean="0">
+                <a:latin typeface="Calibri"/>
+                <a:cs typeface="Calibri"/>
+              </a:rPr>
+              <a:t>Storage type build into </a:t>
+            </a:r>
+            <a:r>
+              <a:rPr lang="en-US" sz="2500" dirty="0" err="1" smtClean="0">
+                <a:latin typeface="Calibri"/>
+                <a:cs typeface="Calibri"/>
+              </a:rPr>
+              <a:t>Erlang</a:t>
+            </a:r>
+            <a:endParaRPr lang="en-US" sz="2500" dirty="0" smtClean="0">
+              <a:latin typeface="Calibri"/>
+              <a:cs typeface="Calibri"/>
+            </a:endParaRPr>
+          </a:p>
+          <a:p>
+            <a:pPr marL="342900" indent="-342900">
+              <a:buFont typeface="Arial"/>
+              <a:buChar char="•"/>
+            </a:pPr>
+            <a:r>
+              <a:rPr lang="en-US" sz="2500" dirty="0" smtClean="0">
+                <a:latin typeface="Calibri"/>
+                <a:cs typeface="Calibri"/>
+              </a:rPr>
+              <a:t>Can be </a:t>
+            </a:r>
+            <a:r>
+              <a:rPr lang="en-US" sz="2500" dirty="0">
+                <a:latin typeface="Calibri"/>
+                <a:cs typeface="Calibri"/>
+              </a:rPr>
+              <a:t>set, </a:t>
+            </a:r>
+            <a:r>
+              <a:rPr lang="en-US" sz="2500" dirty="0" err="1">
+                <a:latin typeface="Calibri"/>
+                <a:cs typeface="Calibri"/>
+              </a:rPr>
+              <a:t>ordered_set</a:t>
+            </a:r>
+            <a:r>
+              <a:rPr lang="en-US" sz="2500" dirty="0">
+                <a:latin typeface="Calibri"/>
+                <a:cs typeface="Calibri"/>
+              </a:rPr>
+              <a:t>, bag, </a:t>
+            </a:r>
+            <a:r>
+              <a:rPr lang="en-US" sz="2500" dirty="0" err="1" smtClean="0">
+                <a:latin typeface="Calibri"/>
+                <a:cs typeface="Calibri"/>
+              </a:rPr>
+              <a:t>duplicate_bag</a:t>
+            </a:r>
+            <a:endParaRPr lang="en-US" sz="2500" dirty="0" smtClean="0">
+              <a:latin typeface="Calibri"/>
+              <a:cs typeface="Calibri"/>
+            </a:endParaRPr>
+          </a:p>
+          <a:p>
+            <a:pPr marL="800100" lvl="1" indent="-342900">
+              <a:buFont typeface="Arial"/>
+              <a:buChar char="•"/>
+            </a:pPr>
+            <a:r>
+              <a:rPr lang="en-US" sz="2500" dirty="0" smtClean="0">
+                <a:latin typeface="Calibri"/>
+                <a:cs typeface="Calibri"/>
+              </a:rPr>
+              <a:t>Set – no duplicate keys/values</a:t>
+            </a:r>
+          </a:p>
+          <a:p>
+            <a:pPr marL="800100" lvl="1" indent="-342900">
+              <a:buFont typeface="Arial"/>
+              <a:buChar char="•"/>
+            </a:pPr>
+            <a:r>
+              <a:rPr lang="en-US" sz="2500" dirty="0" smtClean="0">
+                <a:latin typeface="Calibri"/>
+                <a:cs typeface="Calibri"/>
+              </a:rPr>
+              <a:t>Bag  - duplicate elements per key, distinct values</a:t>
+            </a:r>
+          </a:p>
+          <a:p>
+            <a:pPr marL="800100" lvl="1" indent="-342900">
+              <a:buFont typeface="Arial"/>
+              <a:buChar char="•"/>
+            </a:pPr>
+            <a:r>
+              <a:rPr lang="en-US" sz="2500" dirty="0" smtClean="0">
+                <a:latin typeface="Calibri"/>
+                <a:cs typeface="Calibri"/>
+              </a:rPr>
+              <a:t>Duplicate Bag – duplicate keys and values</a:t>
+            </a:r>
+            <a:endParaRPr lang="en-US" sz="2500" dirty="0">
+              <a:latin typeface="Calibri"/>
+              <a:cs typeface="Calibri"/>
+            </a:endParaRPr>
+          </a:p>
+          <a:p>
+            <a:pPr marL="342900" indent="-342900">
+              <a:buFont typeface="Arial"/>
+              <a:buChar char="•"/>
+            </a:pPr>
+            <a:r>
+              <a:rPr lang="en-US" sz="2500" dirty="0" smtClean="0">
+                <a:latin typeface="Calibri"/>
+                <a:cs typeface="Calibri"/>
+              </a:rPr>
+              <a:t>Both sets and bags gives constant access time</a:t>
+            </a:r>
+          </a:p>
+          <a:p>
+            <a:pPr marL="342900" indent="-342900">
+              <a:buFont typeface="Arial"/>
+              <a:buChar char="•"/>
+            </a:pPr>
+            <a:endParaRPr lang="en-US" dirty="0"/>
+          </a:p>
+        </p:txBody>
+      </p:sp>
+      <p:sp>
+        <p:nvSpPr>
+          <p:cNvPr id="4" name="TextBox 3"/>
+          <p:cNvSpPr txBox="1"/>
+          <p:nvPr/>
+        </p:nvSpPr>
+        <p:spPr>
+          <a:xfrm>
+            <a:off x="4608825" y="1911729"/>
+            <a:ext cx="184666" cy="369332"/>
+          </a:xfrm>
+          <a:prstGeom prst="rect">
+            <a:avLst/>
+          </a:prstGeom>
+          <a:noFill/>
+        </p:spPr>
+        <p:txBody>
+          <a:bodyPr wrap="none" rtlCol="0">
+            <a:spAutoFit/>
+          </a:bodyPr>
+          <a:lstStyle/>
+          <a:p>
+            <a:endParaRPr lang="en-US" dirty="0"/>
+          </a:p>
+        </p:txBody>
+      </p:sp>
+    </p:spTree>
+    <p:extLst>
+      <p:ext uri="{BB962C8B-B14F-4D97-AF65-F5344CB8AC3E}">
+        <p14:creationId xmlns:p14="http://schemas.microsoft.com/office/powerpoint/2010/main" val="4044806952"/>
+      </p:ext>
+    </p:extLst>
+  </p:cSld>
+  <p:clrMapOvr>
+    <a:masterClrMapping/>
+  </p:clrMapOvr>
+  <mc:AlternateContent xmlns:mc="http://schemas.openxmlformats.org/markup-compatibility/2006" xmlns:p14="http://schemas.microsoft.com/office/powerpoint/2010/main">
+    <mc:Choice Requires="p14">
+      <p:transition p14:dur="0"/>
+    </mc:Choice>
+    <mc:Fallback xmlns="">
+      <p:transition xmlns:p14="http://schemas.microsoft.com/office/powerpoint/2010/main"/>
+    </mc:Fallback>
+  </mc:AlternateContent>
 </p:sld>
 </file>
 
@@ -3639,11 +4328,11 @@
   <p:clrMapOvr>
     <a:masterClrMapping/>
   </p:clrMapOvr>
-  <mc:AlternateContent xmlns:mc="http://schemas.openxmlformats.org/markup-compatibility/2006">
-    <mc:Choice xmlns:p14="http://schemas.microsoft.com/office/powerpoint/2010/main" Requires="p14">
+  <mc:AlternateContent xmlns:mc="http://schemas.openxmlformats.org/markup-compatibility/2006" xmlns:p14="http://schemas.microsoft.com/office/powerpoint/2010/main">
+    <mc:Choice Requires="p14">
       <p:transition p14:dur="0"/>
     </mc:Choice>
-    <mc:Fallback>
+    <mc:Fallback xmlns="">
       <p:transition xmlns:p14="http://schemas.microsoft.com/office/powerpoint/2010/main"/>
     </mc:Fallback>
   </mc:AlternateContent>
@@ -3734,8 +4423,19 @@
                 <a:latin typeface="Calibri"/>
                 <a:cs typeface="Calibri"/>
               </a:rPr>
-              <a:t>Dynamically typed, single assignment</a:t>
-            </a:r>
+              <a:t>Dynamically </a:t>
+            </a:r>
+            <a:r>
+              <a:rPr lang="en-US" sz="2500" dirty="0" err="1" smtClean="0">
+                <a:latin typeface="Calibri"/>
+                <a:cs typeface="Calibri"/>
+              </a:rPr>
+              <a:t>typed</a:t>
+            </a:r>
+            <a:endParaRPr lang="en-US" sz="2500" dirty="0" smtClean="0">
+              <a:latin typeface="Calibri"/>
+              <a:cs typeface="Calibri"/>
+            </a:endParaRPr>
           </a:p>
           <a:p>
             <a:pPr marL="342900" indent="-342900">
@@ -3747,7 +4447,14 @@
                 <a:latin typeface="Calibri"/>
                 <a:cs typeface="Calibri"/>
               </a:rPr>
-              <a:t>Semi garbage collected</a:t>
+              <a:t>Semi </a:t>
+            </a:r>
+            <a:r>
+              <a:rPr lang="en-US" sz="2500" dirty="0" smtClean="0">
+                <a:latin typeface="Calibri"/>
+                <a:cs typeface="Calibri"/>
+              </a:rPr>
+              <a:t>garbage collected</a:t>
             </a:r>
           </a:p>
           <a:p>
@@ -3760,15 +4467,91 @@
                 <a:latin typeface="Calibri"/>
                 <a:cs typeface="Calibri"/>
               </a:rPr>
-              <a:t>Uses the actor model</a:t>
-            </a:r>
+              <a:t>Uses the actor </a:t>
+            </a:r>
+            <a:r>
+              <a:rPr lang="en-US" sz="2500" dirty="0" smtClean="0">
+                <a:latin typeface="Calibri"/>
+                <a:cs typeface="Calibri"/>
+              </a:rPr>
+              <a:t>model</a:t>
+            </a:r>
+            <a:endParaRPr lang="en-US" dirty="0">
+              <a:latin typeface="Calibri"/>
+              <a:cs typeface="Calibri"/>
+            </a:endParaRPr>
           </a:p>
           <a:p>
             <a:pPr marL="342900" indent="-342900">
               <a:buFont typeface="Arial"/>
               <a:buChar char="•"/>
             </a:pPr>
-            <a:endParaRPr lang="en-US" dirty="0" smtClean="0">
+            <a:r>
+              <a:rPr lang="en-US" sz="2500" dirty="0" smtClean="0">
+                <a:latin typeface="Calibri"/>
+                <a:cs typeface="Calibri"/>
+              </a:rPr>
+              <a:t>Single Assignment:</a:t>
+            </a:r>
+          </a:p>
+          <a:p>
+            <a:pPr lvl="2" indent="0">
+              <a:buNone/>
+            </a:pPr>
+            <a:r>
+              <a:rPr lang="en-US" sz="2200" dirty="0" smtClean="0">
+                <a:latin typeface="Consolas"/>
+                <a:cs typeface="Consolas"/>
+              </a:rPr>
+              <a:t>x = 1</a:t>
+            </a:r>
+          </a:p>
+          <a:p>
+            <a:pPr lvl="2" indent="0">
+              <a:buNone/>
+            </a:pPr>
+            <a:r>
+              <a:rPr lang="en-US" sz="2200" dirty="0" smtClean="0">
+                <a:latin typeface="Consolas"/>
+                <a:cs typeface="Consolas"/>
+              </a:rPr>
+              <a:t>x = 2    %</a:t>
+            </a:r>
+            <a:r>
+              <a:rPr lang="en-US" sz="2200" dirty="0">
+                <a:latin typeface="Consolas"/>
+                <a:cs typeface="Consolas"/>
+              </a:rPr>
+              <a:t> </a:t>
+            </a:r>
+            <a:r>
+              <a:rPr lang="en-US" sz="2200" dirty="0" smtClean="0">
+                <a:latin typeface="Consolas"/>
+                <a:cs typeface="Consolas"/>
+              </a:rPr>
+              <a:t>invalid operation</a:t>
+            </a:r>
+            <a:endParaRPr lang="en-US" sz="2200" dirty="0" smtClean="0">
+              <a:latin typeface="Consolas"/>
+              <a:cs typeface="Consolas"/>
+            </a:endParaRPr>
+          </a:p>
+          <a:p>
+            <a:pPr marL="342900" indent="-342900">
+              <a:buFont typeface="Arial"/>
+              <a:buChar char="•"/>
+            </a:pPr>
+            <a:endParaRPr lang="en-US" sz="2500" dirty="0" smtClean="0">
+              <a:latin typeface="Calibri"/>
+              <a:cs typeface="Calibri"/>
+            </a:endParaRPr>
+          </a:p>
+          <a:p>
+            <a:pPr marL="342900" indent="-342900">
+              <a:buFont typeface="Arial"/>
+              <a:buChar char="•"/>
+            </a:pPr>
+            <a:endParaRPr lang="en-US" sz="2500" dirty="0" smtClean="0">
               <a:latin typeface="Calibri"/>
               <a:cs typeface="Calibri"/>
             </a:endParaRPr>
@@ -3785,6 +4568,21 @@
   <p:clrMapOvr>
     <a:masterClrMapping/>
   </p:clrMapOvr>
+  <mc:AlternateContent xmlns:mc="http://schemas.openxmlformats.org/markup-compatibility/2006" xmlns:p14="http://schemas.microsoft.com/office/powerpoint/2010/main">
+    <mc:Choice Requires="p14">
+      <p:transition p14:dur="0"/>
+    </mc:Choice>
+    <mc:Fallback xmlns="">
+      <p:transition xmlns:p14="http://schemas.microsoft.com/office/powerpoint/2010/main"/>
+    </mc:Fallback>
+  </mc:AlternateContent>
+  <p:timing>
+    <p:tnLst>
+      <p:par>
+        <p:cTn xmlns:p14="http://schemas.microsoft.com/office/powerpoint/2010/main" id="1" dur="indefinite" restart="never" nodeType="tmRoot"/>
+      </p:par>
+    </p:tnLst>
+  </p:timing>
 </p:sld>
 </file>
 
@@ -3942,6 +4740,25 @@
   <p:clrMapOvr>
     <a:masterClrMapping/>
   </p:clrMapOvr>
+  <mc:AlternateContent xmlns:mc="http://schemas.openxmlformats.org/markup-compatibility/2006" xmlns:p14="http://schemas.microsoft.com/office/powerpoint/2010/main">
+    <mc:Choice Requires="p14">
+      <p:transition spd="slow" p14:dur="3400">
+        <p14:reveal/>
+      </p:transition>
+    </mc:Choice>
+    <mc:Fallback xmlns="">
+      <p:transition xmlns:p14="http://schemas.microsoft.com/office/powerpoint/2010/main" spd="slow">
+        <p:fade/>
+      </p:transition>
+    </mc:Fallback>
+  </mc:AlternateContent>
+  <p:timing>
+    <p:tnLst>
+      <p:par>
+        <p:cTn xmlns:p14="http://schemas.microsoft.com/office/powerpoint/2010/main" id="1" dur="indefinite" restart="never" nodeType="tmRoot"/>
+      </p:par>
+    </p:tnLst>
+  </p:timing>
 </p:sld>
 </file>
 
@@ -3997,7 +4814,9 @@
         </p:nvSpPr>
         <p:spPr/>
         <p:txBody>
-          <a:bodyPr/>
+          <a:bodyPr>
+            <a:normAutofit/>
+          </a:bodyPr>
           <a:lstStyle/>
           <a:p>
             <a:pPr marL="342900" indent="-342900">
@@ -4005,16 +4824,32 @@
               <a:buChar char="•"/>
             </a:pPr>
             <a:r>
-              <a:rPr lang="en-US" dirty="0" smtClean="0"/>
+              <a:rPr lang="en-US" sz="2500" dirty="0" smtClean="0">
+                <a:latin typeface="Calibri"/>
+                <a:cs typeface="Calibri"/>
+              </a:rPr>
               <a:t>Essential </a:t>
             </a:r>
             <a:r>
-              <a:rPr lang="en-US" dirty="0" err="1" smtClean="0"/>
-              <a:t>erlang</a:t>
-            </a:r>
-            <a:r>
-              <a:rPr lang="en-US" dirty="0" smtClean="0"/>
-              <a:t> data type</a:t>
+              <a:rPr lang="en-US" sz="2500" dirty="0" err="1" smtClean="0">
+                <a:latin typeface="Calibri"/>
+                <a:cs typeface="Calibri"/>
+              </a:rPr>
+              <a:t>Erlang</a:t>
+            </a:r>
+            <a:r>
+              <a:rPr lang="en-US" sz="2500" dirty="0" smtClean="0">
+                <a:latin typeface="Calibri"/>
+                <a:cs typeface="Calibri"/>
+              </a:rPr>
+              <a:t> data </a:t>
+            </a:r>
+            <a:r>
+              <a:rPr lang="en-US" sz="2500" dirty="0" smtClean="0">
+                <a:latin typeface="Calibri"/>
+                <a:cs typeface="Calibri"/>
+              </a:rPr>
+              <a:t>type</a:t>
             </a:r>
           </a:p>
           <a:p>
@@ -4023,23 +4858,38 @@
               <a:buChar char="•"/>
             </a:pPr>
             <a:r>
-              <a:rPr lang="en-US" dirty="0" smtClean="0"/>
+              <a:rPr lang="en-US" sz="2500" dirty="0" smtClean="0">
+                <a:latin typeface="Calibri"/>
+                <a:cs typeface="Calibri"/>
+              </a:rPr>
               <a:t>Similar to </a:t>
             </a:r>
             <a:r>
-              <a:rPr lang="en-US" dirty="0" err="1" smtClean="0"/>
+              <a:rPr lang="en-US" sz="2500" dirty="0" err="1" smtClean="0">
+                <a:latin typeface="Calibri"/>
+                <a:cs typeface="Calibri"/>
+              </a:rPr>
               <a:t>enum</a:t>
             </a:r>
             <a:r>
-              <a:rPr lang="en-US" dirty="0" smtClean="0"/>
+              <a:rPr lang="en-US" sz="2500" dirty="0" smtClean="0">
+                <a:latin typeface="Calibri"/>
+                <a:cs typeface="Calibri"/>
+              </a:rPr>
               <a:t>(</a:t>
             </a:r>
             <a:r>
-              <a:rPr lang="en-US" dirty="0" err="1" smtClean="0"/>
+              <a:rPr lang="en-US" sz="2500" dirty="0" err="1" smtClean="0">
+                <a:latin typeface="Calibri"/>
+                <a:cs typeface="Calibri"/>
+              </a:rPr>
               <a:t>erable</a:t>
             </a:r>
             <a:r>
-              <a:rPr lang="en-US" dirty="0" smtClean="0"/>
+              <a:rPr lang="en-US" sz="2500" dirty="0" smtClean="0">
+                <a:latin typeface="Calibri"/>
+                <a:cs typeface="Calibri"/>
+              </a:rPr>
               <a:t>) types in java</a:t>
             </a:r>
           </a:p>
@@ -4049,7 +4899,10 @@
               <a:buChar char="•"/>
             </a:pPr>
             <a:r>
-              <a:rPr lang="en-US" dirty="0" smtClean="0"/>
+              <a:rPr lang="en-US" sz="2500" dirty="0" smtClean="0">
+                <a:latin typeface="Calibri"/>
+                <a:cs typeface="Calibri"/>
+              </a:rPr>
               <a:t>Start with lowercase or delimited by single quotes</a:t>
             </a:r>
           </a:p>
@@ -4059,40 +4912,68 @@
               <a:buChar char="•"/>
             </a:pPr>
             <a:r>
-              <a:rPr lang="en-US" dirty="0" err="1" smtClean="0"/>
+              <a:rPr lang="en-US" sz="2500" dirty="0" err="1" smtClean="0">
+                <a:latin typeface="Calibri"/>
+                <a:cs typeface="Calibri"/>
+              </a:rPr>
               <a:t>iAmAnAtom</a:t>
             </a:r>
             <a:r>
-              <a:rPr lang="en-US" dirty="0" smtClean="0"/>
+              <a:rPr lang="en-US" sz="2500" dirty="0" smtClean="0">
+                <a:latin typeface="Calibri"/>
+                <a:cs typeface="Calibri"/>
+              </a:rPr>
               <a:t>, </a:t>
             </a:r>
             <a:r>
-              <a:rPr lang="en-US" dirty="0" err="1" smtClean="0"/>
+              <a:rPr lang="en-US" sz="2500" dirty="0" err="1" smtClean="0">
+                <a:latin typeface="Calibri"/>
+                <a:cs typeface="Calibri"/>
+              </a:rPr>
               <a:t>IAmNot</a:t>
             </a:r>
             <a:r>
-              <a:rPr lang="en-US" dirty="0" smtClean="0"/>
+              <a:rPr lang="en-US" sz="2500" dirty="0" smtClean="0">
+                <a:latin typeface="Calibri"/>
+                <a:cs typeface="Calibri"/>
+              </a:rPr>
               <a:t>, ‘But </a:t>
             </a:r>
             <a:r>
-              <a:rPr lang="en-US" dirty="0" err="1" smtClean="0"/>
+              <a:rPr lang="en-US" sz="2500" dirty="0" err="1" smtClean="0">
+                <a:latin typeface="Calibri"/>
+                <a:cs typeface="Calibri"/>
+              </a:rPr>
               <a:t>i</a:t>
             </a:r>
             <a:r>
-              <a:rPr lang="en-US" dirty="0" smtClean="0"/>
-              <a:t> @m, “Not me though”</a:t>
-            </a:r>
-          </a:p>
-          <a:p>
-            <a:pPr marL="342900" indent="-342900">
-              <a:buFont typeface="Arial"/>
-              <a:buChar char="•"/>
-            </a:pPr>
-            <a:r>
-              <a:rPr lang="en-US" dirty="0" smtClean="0"/>
-              <a:t>Never garbage collected</a:t>
-            </a:r>
-            <a:endParaRPr lang="en-US" dirty="0"/>
+              <a:rPr lang="en-US" sz="2500" dirty="0" smtClean="0">
+                <a:latin typeface="Calibri"/>
+                <a:cs typeface="Calibri"/>
+              </a:rPr>
+              <a:t> @</a:t>
+            </a:r>
+            <a:r>
+              <a:rPr lang="en-US" sz="2500" dirty="0" smtClean="0">
+                <a:latin typeface="Calibri"/>
+                <a:cs typeface="Calibri"/>
+              </a:rPr>
+              <a:t>m’, </a:t>
+            </a:r>
+            <a:r>
+              <a:rPr lang="en-US" sz="2500" dirty="0" smtClean="0">
+                <a:latin typeface="Calibri"/>
+                <a:cs typeface="Calibri"/>
+              </a:rPr>
+              <a:t>“Not me </a:t>
+            </a:r>
+            <a:r>
+              <a:rPr lang="en-US" sz="2500" dirty="0" smtClean="0">
+                <a:latin typeface="Calibri"/>
+                <a:cs typeface="Calibri"/>
+              </a:rPr>
+              <a:t>though”</a:t>
+            </a:r>
           </a:p>
         </p:txBody>
       </p:sp>
@@ -4106,6 +4987,21 @@
   <p:clrMapOvr>
     <a:masterClrMapping/>
   </p:clrMapOvr>
+  <mc:AlternateContent xmlns:mc="http://schemas.openxmlformats.org/markup-compatibility/2006" xmlns:p14="http://schemas.microsoft.com/office/powerpoint/2010/main">
+    <mc:Choice Requires="p14">
+      <p:transition p14:dur="0"/>
+    </mc:Choice>
+    <mc:Fallback xmlns="">
+      <p:transition xmlns:p14="http://schemas.microsoft.com/office/powerpoint/2010/main"/>
+    </mc:Fallback>
+  </mc:AlternateContent>
+  <p:timing>
+    <p:tnLst>
+      <p:par>
+        <p:cTn xmlns:p14="http://schemas.microsoft.com/office/powerpoint/2010/main" id="1" dur="indefinite" restart="never" nodeType="tmRoot"/>
+      </p:par>
+    </p:tnLst>
+  </p:timing>
 </p:sld>
 </file>
 
@@ -4136,19 +5032,14 @@
             <p:ph type="title"/>
           </p:nvPr>
         </p:nvSpPr>
-        <p:spPr>
-          <a:xfrm>
-            <a:off x="457200" y="152718"/>
-            <a:ext cx="6613156" cy="1371600"/>
-          </a:xfrm>
-        </p:spPr>
+        <p:spPr/>
         <p:txBody>
           <a:bodyPr/>
           <a:lstStyle/>
           <a:p>
             <a:r>
               <a:rPr lang="en-US" dirty="0" smtClean="0"/>
-              <a:t>Message Passing Code</a:t>
+              <a:t>Garbage Collector</a:t>
             </a:r>
             <a:endParaRPr lang="en-US" dirty="0"/>
           </a:p>
@@ -4164,371 +5055,94 @@
             <p:ph idx="1"/>
           </p:nvPr>
         </p:nvSpPr>
-        <p:spPr>
-          <a:xfrm>
-            <a:off x="457199" y="1752600"/>
-            <a:ext cx="8380745" cy="4373563"/>
-          </a:xfrm>
-        </p:spPr>
+        <p:spPr/>
         <p:txBody>
           <a:bodyPr>
             <a:normAutofit/>
           </a:bodyPr>
           <a:lstStyle/>
           <a:p>
-            <a:r>
-              <a:rPr lang="en-US" dirty="0">
-                <a:solidFill>
-                  <a:srgbClr val="F0248D"/>
-                </a:solidFill>
-                <a:latin typeface="Consolas"/>
-                <a:cs typeface="Consolas"/>
-              </a:rPr>
-              <a:t>go()</a:t>
-            </a:r>
-            <a:r>
-              <a:rPr lang="en-US" dirty="0">
-                <a:latin typeface="Consolas"/>
-                <a:cs typeface="Consolas"/>
-              </a:rPr>
-              <a:t>-&gt;</a:t>
-            </a:r>
-          </a:p>
-          <a:p>
-            <a:r>
-              <a:rPr lang="en-US" dirty="0">
-                <a:latin typeface="Consolas"/>
-                <a:cs typeface="Consolas"/>
-              </a:rPr>
-              <a:t> </a:t>
-            </a:r>
-            <a:r>
-              <a:rPr lang="en-US" dirty="0" err="1">
-                <a:latin typeface="Consolas"/>
-                <a:cs typeface="Consolas"/>
-              </a:rPr>
-              <a:t>Pid</a:t>
-            </a:r>
-            <a:r>
-              <a:rPr lang="en-US" dirty="0">
-                <a:latin typeface="Consolas"/>
-                <a:cs typeface="Consolas"/>
-              </a:rPr>
-              <a:t> = </a:t>
-            </a:r>
-            <a:r>
-              <a:rPr lang="en-US" dirty="0">
-                <a:solidFill>
-                  <a:srgbClr val="F0248D"/>
-                </a:solidFill>
-                <a:latin typeface="Consolas"/>
-                <a:cs typeface="Consolas"/>
-              </a:rPr>
-              <a:t>spawn</a:t>
-            </a:r>
-            <a:r>
-              <a:rPr lang="en-US" dirty="0">
-                <a:latin typeface="Consolas"/>
-                <a:cs typeface="Consolas"/>
-              </a:rPr>
-              <a:t>(?MODULE, </a:t>
-            </a:r>
-            <a:r>
-              <a:rPr lang="en-US" dirty="0" smtClean="0">
-                <a:latin typeface="Consolas"/>
-                <a:cs typeface="Consolas"/>
-              </a:rPr>
-              <a:t>receiver, </a:t>
-            </a:r>
-            <a:r>
-              <a:rPr lang="en-US" dirty="0">
-                <a:latin typeface="Consolas"/>
-                <a:cs typeface="Consolas"/>
-              </a:rPr>
-              <a:t>[]), </a:t>
-            </a:r>
-            <a:endParaRPr lang="en-US" dirty="0" smtClean="0">
-              <a:latin typeface="Consolas"/>
-              <a:cs typeface="Consolas"/>
+            <a:pPr marL="342900" indent="-342900">
+              <a:buFont typeface="Arial"/>
+              <a:buChar char="•"/>
+            </a:pPr>
+            <a:r>
+              <a:rPr lang="en-US" sz="2500" dirty="0" smtClean="0">
+                <a:latin typeface="Calabri"/>
+                <a:cs typeface="Calabri"/>
+              </a:rPr>
+              <a:t>Garbage Collector maintains soft real-time property</a:t>
+            </a:r>
+          </a:p>
+          <a:p>
+            <a:pPr marL="342900" indent="-342900">
+              <a:buFont typeface="Arial"/>
+              <a:buChar char="•"/>
+            </a:pPr>
+            <a:r>
+              <a:rPr lang="en-US" sz="2500" dirty="0" smtClean="0">
+                <a:latin typeface="Calabri"/>
+                <a:cs typeface="Calabri"/>
+              </a:rPr>
+              <a:t>Copying, generational GC</a:t>
+            </a:r>
+          </a:p>
+          <a:p>
+            <a:pPr marL="342900" indent="-342900">
+              <a:buFont typeface="Arial"/>
+              <a:buChar char="•"/>
+            </a:pPr>
+            <a:r>
+              <a:rPr lang="en-US" sz="2500" dirty="0" smtClean="0">
+                <a:latin typeface="Calabri"/>
+                <a:cs typeface="Calabri"/>
+              </a:rPr>
+              <a:t>Runs on a per thread basis</a:t>
+            </a:r>
+          </a:p>
+          <a:p>
+            <a:pPr marL="342900" indent="-342900">
+              <a:buFont typeface="Arial"/>
+              <a:buChar char="•"/>
+            </a:pPr>
+            <a:r>
+              <a:rPr lang="en-US" sz="2500" dirty="0" smtClean="0">
+                <a:latin typeface="Calabri"/>
+                <a:cs typeface="Calabri"/>
+              </a:rPr>
+              <a:t>Atoms are never garbage collected</a:t>
+            </a:r>
+          </a:p>
+          <a:p>
+            <a:pPr marL="342900" indent="-342900">
+              <a:buFont typeface="Arial"/>
+              <a:buChar char="•"/>
+            </a:pPr>
+            <a:endParaRPr lang="en-US" sz="2500" dirty="0">
+              <a:latin typeface="Calabri"/>
+              <a:cs typeface="Calabri"/>
             </a:endParaRPr>
-          </a:p>
-          <a:p>
-            <a:r>
-              <a:rPr lang="en-US" dirty="0">
-                <a:latin typeface="Consolas"/>
-                <a:cs typeface="Consolas"/>
-              </a:rPr>
-              <a:t> </a:t>
-            </a:r>
-            <a:r>
-              <a:rPr lang="en-US" dirty="0" err="1" smtClean="0">
-                <a:latin typeface="Consolas"/>
-                <a:cs typeface="Consolas"/>
-              </a:rPr>
-              <a:t>Pid</a:t>
-            </a:r>
-            <a:r>
-              <a:rPr lang="en-US" dirty="0" smtClean="0">
-                <a:latin typeface="Consolas"/>
-                <a:cs typeface="Consolas"/>
-              </a:rPr>
-              <a:t> </a:t>
-            </a:r>
-            <a:r>
-              <a:rPr lang="en-US" dirty="0">
-                <a:latin typeface="Consolas"/>
-                <a:cs typeface="Consolas"/>
-              </a:rPr>
-              <a:t>! {</a:t>
-            </a:r>
-            <a:r>
-              <a:rPr lang="en-US" dirty="0" err="1">
-                <a:latin typeface="Consolas"/>
-                <a:cs typeface="Consolas"/>
-              </a:rPr>
-              <a:t>msg</a:t>
-            </a:r>
-            <a:r>
-              <a:rPr lang="en-US" dirty="0">
-                <a:latin typeface="Consolas"/>
-                <a:cs typeface="Consolas"/>
-              </a:rPr>
-              <a:t>, </a:t>
-            </a:r>
-            <a:r>
-              <a:rPr lang="en-US" dirty="0">
-                <a:solidFill>
-                  <a:srgbClr val="00CF18"/>
-                </a:solidFill>
-                <a:latin typeface="Consolas"/>
-                <a:cs typeface="Consolas"/>
-              </a:rPr>
-              <a:t>"</a:t>
-            </a:r>
-            <a:r>
-              <a:rPr lang="en-US" dirty="0" err="1">
-                <a:solidFill>
-                  <a:srgbClr val="00CF18"/>
-                </a:solidFill>
-                <a:latin typeface="Consolas"/>
-                <a:cs typeface="Consolas"/>
-              </a:rPr>
-              <a:t>Helo</a:t>
-            </a:r>
-            <a:r>
-              <a:rPr lang="en-US" dirty="0">
-                <a:solidFill>
-                  <a:srgbClr val="00CF18"/>
-                </a:solidFill>
-                <a:latin typeface="Consolas"/>
-                <a:cs typeface="Consolas"/>
-              </a:rPr>
-              <a:t> world!"</a:t>
-            </a:r>
-            <a:r>
-              <a:rPr lang="en-US" dirty="0">
-                <a:latin typeface="Consolas"/>
-                <a:cs typeface="Consolas"/>
-              </a:rPr>
-              <a:t>}</a:t>
-            </a:r>
-            <a:r>
-              <a:rPr lang="en-US" dirty="0" smtClean="0">
-                <a:latin typeface="Consolas"/>
-                <a:cs typeface="Consolas"/>
-              </a:rPr>
-              <a:t>.</a:t>
-            </a:r>
-          </a:p>
-          <a:p>
-            <a:r>
-              <a:rPr lang="en-US" dirty="0" smtClean="0">
-                <a:latin typeface="Consolas"/>
-                <a:cs typeface="Consolas"/>
-              </a:rPr>
-              <a:t> </a:t>
-            </a:r>
-            <a:r>
-              <a:rPr lang="en-US" dirty="0">
-                <a:latin typeface="Consolas"/>
-                <a:cs typeface="Consolas"/>
-              </a:rPr>
-              <a:t> </a:t>
-            </a:r>
-          </a:p>
-          <a:p>
-            <a:r>
-              <a:rPr lang="en-US" dirty="0" err="1">
-                <a:solidFill>
-                  <a:srgbClr val="F0248D"/>
-                </a:solidFill>
-                <a:latin typeface="Consolas"/>
-                <a:cs typeface="Consolas"/>
-              </a:rPr>
-              <a:t>reciever</a:t>
-            </a:r>
-            <a:r>
-              <a:rPr lang="en-US" dirty="0">
-                <a:solidFill>
-                  <a:srgbClr val="F0248D"/>
-                </a:solidFill>
-                <a:latin typeface="Consolas"/>
-                <a:cs typeface="Consolas"/>
-              </a:rPr>
-              <a:t>()</a:t>
-            </a:r>
-            <a:r>
-              <a:rPr lang="en-US" dirty="0">
-                <a:latin typeface="Consolas"/>
-                <a:cs typeface="Consolas"/>
-              </a:rPr>
-              <a:t>-&gt;</a:t>
-            </a:r>
-          </a:p>
-          <a:p>
-            <a:r>
-              <a:rPr lang="en-US" dirty="0">
-                <a:latin typeface="Consolas"/>
-                <a:cs typeface="Consolas"/>
-              </a:rPr>
-              <a:t> receive</a:t>
-            </a:r>
-          </a:p>
-          <a:p>
-            <a:r>
-              <a:rPr lang="en-US" dirty="0">
-                <a:latin typeface="Consolas"/>
-                <a:cs typeface="Consolas"/>
-              </a:rPr>
-              <a:t> </a:t>
-            </a:r>
-            <a:r>
-              <a:rPr lang="en-US" dirty="0">
-                <a:latin typeface="Consolas"/>
-                <a:cs typeface="Consolas"/>
-              </a:rPr>
-              <a:t> </a:t>
-            </a:r>
-            <a:r>
-              <a:rPr lang="en-US" dirty="0" smtClean="0">
-                <a:latin typeface="Consolas"/>
-                <a:cs typeface="Consolas"/>
-              </a:rPr>
-              <a:t>{</a:t>
-            </a:r>
-            <a:r>
-              <a:rPr lang="en-US" dirty="0" err="1">
-                <a:latin typeface="Consolas"/>
-                <a:cs typeface="Consolas"/>
-              </a:rPr>
-              <a:t>msg</a:t>
-            </a:r>
-            <a:r>
-              <a:rPr lang="en-US" dirty="0">
-                <a:latin typeface="Consolas"/>
-                <a:cs typeface="Consolas"/>
-              </a:rPr>
-              <a:t>, Text} -&gt; </a:t>
-            </a:r>
-            <a:endParaRPr lang="en-US" dirty="0" smtClean="0">
-              <a:latin typeface="Consolas"/>
-              <a:cs typeface="Consolas"/>
-            </a:endParaRPr>
-          </a:p>
-          <a:p>
-            <a:r>
-              <a:rPr lang="en-US" dirty="0" smtClean="0">
-                <a:latin typeface="Consolas"/>
-                <a:cs typeface="Consolas"/>
-              </a:rPr>
-              <a:t>    </a:t>
-            </a:r>
-            <a:r>
-              <a:rPr lang="en-US" dirty="0" err="1" smtClean="0">
-                <a:latin typeface="Consolas"/>
-                <a:cs typeface="Consolas"/>
-              </a:rPr>
-              <a:t>io:</a:t>
-            </a:r>
-            <a:r>
-              <a:rPr lang="en-US" dirty="0" err="1" smtClean="0">
-                <a:solidFill>
-                  <a:srgbClr val="F0248D"/>
-                </a:solidFill>
-                <a:latin typeface="Consolas"/>
-                <a:cs typeface="Consolas"/>
-              </a:rPr>
-              <a:t>format</a:t>
-            </a:r>
-            <a:r>
-              <a:rPr lang="en-US" dirty="0" smtClean="0">
-                <a:latin typeface="Consolas"/>
-                <a:cs typeface="Consolas"/>
-              </a:rPr>
-              <a:t>(</a:t>
-            </a:r>
-            <a:r>
-              <a:rPr lang="en-US" dirty="0" smtClean="0">
-                <a:solidFill>
-                  <a:srgbClr val="00CF18"/>
-                </a:solidFill>
-                <a:latin typeface="Consolas"/>
-                <a:cs typeface="Consolas"/>
-              </a:rPr>
-              <a:t>“Message Received: </a:t>
-            </a:r>
-            <a:r>
-              <a:rPr lang="en-US" dirty="0">
-                <a:solidFill>
-                  <a:srgbClr val="00CF18"/>
-                </a:solidFill>
-                <a:latin typeface="Consolas"/>
-                <a:cs typeface="Consolas"/>
-              </a:rPr>
-              <a:t>~</a:t>
-            </a:r>
-            <a:r>
-              <a:rPr lang="en-US" dirty="0" smtClean="0">
-                <a:solidFill>
-                  <a:srgbClr val="00CF18"/>
-                </a:solidFill>
-                <a:latin typeface="Consolas"/>
-                <a:cs typeface="Consolas"/>
-              </a:rPr>
-              <a:t>s"</a:t>
-            </a:r>
-            <a:r>
-              <a:rPr lang="en-US" dirty="0">
-                <a:latin typeface="Consolas"/>
-                <a:cs typeface="Consolas"/>
-              </a:rPr>
-              <a:t>, [Text])</a:t>
-            </a:r>
-          </a:p>
-          <a:p>
-            <a:r>
-              <a:rPr lang="en-US" dirty="0">
-                <a:latin typeface="Consolas"/>
-                <a:cs typeface="Consolas"/>
-              </a:rPr>
-              <a:t> end.</a:t>
-            </a:r>
-          </a:p>
-          <a:p>
-            <a:endParaRPr lang="en-US" dirty="0"/>
           </a:p>
         </p:txBody>
       </p:sp>
     </p:spTree>
     <p:extLst>
       <p:ext uri="{BB962C8B-B14F-4D97-AF65-F5344CB8AC3E}">
-        <p14:creationId xmlns:p14="http://schemas.microsoft.com/office/powerpoint/2010/main" val="721214543"/>
+        <p14:creationId xmlns:p14="http://schemas.microsoft.com/office/powerpoint/2010/main" val="2906421527"/>
       </p:ext>
     </p:extLst>
   </p:cSld>
   <p:clrMapOvr>
     <a:masterClrMapping/>
   </p:clrMapOvr>
+  <mc:AlternateContent xmlns:mc="http://schemas.openxmlformats.org/markup-compatibility/2006" xmlns:p14="http://schemas.microsoft.com/office/powerpoint/2010/main">
+    <mc:Choice Requires="p14">
+      <p:transition p14:dur="0"/>
+    </mc:Choice>
+    <mc:Fallback xmlns="">
+      <p:transition xmlns:p14="http://schemas.microsoft.com/office/powerpoint/2010/main"/>
+    </mc:Fallback>
+  </mc:AlternateContent>
 </p:sld>
 </file>
 
@@ -4559,14 +5173,19 @@
             <p:ph type="title"/>
           </p:nvPr>
         </p:nvSpPr>
-        <p:spPr/>
+        <p:spPr>
+          <a:xfrm>
+            <a:off x="457200" y="152718"/>
+            <a:ext cx="6613156" cy="1371600"/>
+          </a:xfrm>
+        </p:spPr>
         <p:txBody>
           <a:bodyPr/>
           <a:lstStyle/>
           <a:p>
             <a:r>
               <a:rPr lang="en-US" dirty="0" smtClean="0"/>
-              <a:t>Pattern Matching</a:t>
+              <a:t>Message Passing Code</a:t>
             </a:r>
             <a:endParaRPr lang="en-US" dirty="0"/>
           </a:p>
@@ -4585,12 +5204,12 @@
         <p:spPr>
           <a:xfrm>
             <a:off x="457199" y="1752600"/>
-            <a:ext cx="8066507" cy="4373563"/>
+            <a:ext cx="8380745" cy="4373563"/>
           </a:xfrm>
         </p:spPr>
         <p:txBody>
           <a:bodyPr>
-            <a:normAutofit fontScale="92500" lnSpcReduction="20000"/>
+            <a:normAutofit/>
           </a:bodyPr>
           <a:lstStyle/>
           <a:p>
@@ -4649,37 +5268,69 @@
                 <a:latin typeface="Consolas"/>
                 <a:cs typeface="Consolas"/>
               </a:rPr>
-              <a:t>(?MODULE, receiver, []), </a:t>
-            </a:r>
-          </a:p>
-          <a:p>
+              <a:t>(?MODULE, </a:t>
+            </a:r>
+            <a:r>
+              <a:rPr lang="en-US" dirty="0" smtClean="0">
+                <a:latin typeface="Consolas"/>
+                <a:cs typeface="Consolas"/>
+              </a:rPr>
+              <a:t>receiver, </a:t>
+            </a:r>
             <a:r>
               <a:rPr lang="en-US" dirty="0">
                 <a:latin typeface="Consolas"/>
                 <a:cs typeface="Consolas"/>
               </a:rPr>
+              <a:t>[]), </a:t>
+            </a:r>
+            <a:endParaRPr lang="en-US" dirty="0" smtClean="0">
+              <a:latin typeface="Consolas"/>
+              <a:cs typeface="Consolas"/>
+            </a:endParaRPr>
+          </a:p>
+          <a:p>
+            <a:r>
+              <a:rPr lang="en-US" dirty="0">
+                <a:latin typeface="Consolas"/>
+                <a:cs typeface="Consolas"/>
+              </a:rPr>
               <a:t> </a:t>
             </a:r>
             <a:r>
+              <a:rPr lang="en-US" dirty="0" err="1" smtClean="0">
+                <a:latin typeface="Consolas"/>
+                <a:cs typeface="Consolas"/>
+              </a:rPr>
+              <a:t>Pid</a:t>
+            </a:r>
+            <a:r>
+              <a:rPr lang="en-US" dirty="0" smtClean="0">
+                <a:latin typeface="Consolas"/>
+                <a:cs typeface="Consolas"/>
+              </a:rPr>
+              <a:t> </a:t>
+            </a:r>
+            <a:r>
+              <a:rPr lang="en-US" dirty="0">
+                <a:latin typeface="Consolas"/>
+                <a:cs typeface="Consolas"/>
+              </a:rPr>
+              <a:t>! {</a:t>
+            </a:r>
+            <a:r>
               <a:rPr lang="en-US" dirty="0" err="1">
                 <a:latin typeface="Consolas"/>
                 <a:cs typeface="Consolas"/>
               </a:rPr>
-              <a:t>Pid</a:t>
+              <a:t>msg</a:t>
             </a:r>
             <a:r>
               <a:rPr lang="en-US" dirty="0">
                 <a:latin typeface="Consolas"/>
                 <a:cs typeface="Consolas"/>
               </a:rPr>
-              <a:t> ! </a:t>
-            </a:r>
-            <a:r>
-              <a:rPr lang="en-US" dirty="0" smtClean="0">
-                <a:latin typeface="Consolas"/>
-                <a:cs typeface="Consolas"/>
-              </a:rPr>
-              <a:t>{bob, </a:t>
+              <a:t>, </a:t>
             </a:r>
             <a:r>
               <a:rPr lang="en-US" dirty="0">
@@ -4692,14 +5343,14 @@
               <a:t>"</a:t>
             </a:r>
             <a:r>
-              <a:rPr lang="en-US" dirty="0" err="1">
+              <a:rPr lang="en-US" dirty="0" smtClean="0">
                 <a:solidFill>
                   <a:srgbClr val="00CF18"/>
                 </a:solidFill>
                 <a:latin typeface="Consolas"/>
                 <a:cs typeface="Consolas"/>
               </a:rPr>
-              <a:t>Helo</a:t>
+              <a:t>Hello </a:t>
             </a:r>
             <a:r>
               <a:rPr lang="en-US" dirty="0">
@@ -4709,35 +5360,49 @@
                 <a:latin typeface="Consolas"/>
                 <a:cs typeface="Consolas"/>
               </a:rPr>
-              <a:t> world!"</a:t>
+              <a:t>world!"</a:t>
             </a:r>
             <a:r>
               <a:rPr lang="en-US" dirty="0">
                 <a:latin typeface="Consolas"/>
                 <a:cs typeface="Consolas"/>
               </a:rPr>
-              <a:t>}.</a:t>
-            </a:r>
-          </a:p>
-          <a:p>
+              <a:t>}</a:t>
+            </a:r>
+            <a:r>
+              <a:rPr lang="en-US" dirty="0" smtClean="0">
+                <a:latin typeface="Consolas"/>
+                <a:cs typeface="Consolas"/>
+              </a:rPr>
+              <a:t>.</a:t>
+            </a:r>
+          </a:p>
+          <a:p>
+            <a:r>
+              <a:rPr lang="en-US" dirty="0" smtClean="0">
+                <a:latin typeface="Consolas"/>
+                <a:cs typeface="Consolas"/>
+              </a:rPr>
+              <a:t> </a:t>
+            </a:r>
             <a:r>
               <a:rPr lang="en-US" dirty="0">
                 <a:latin typeface="Consolas"/>
                 <a:cs typeface="Consolas"/>
               </a:rPr>
-              <a:t>  </a:t>
-            </a:r>
-          </a:p>
-          <a:p>
-            <a:r>
-              <a:rPr lang="en-US" dirty="0" err="1">
+              <a:t> </a:t>
+            </a:r>
+          </a:p>
+          <a:p>
+            <a:r>
+              <a:rPr lang="en-US" dirty="0" smtClean="0">
                 <a:solidFill>
                   <a:srgbClr val="F0248D"/>
                 </a:solidFill>
                 <a:latin typeface="Consolas"/>
                 <a:cs typeface="Consolas"/>
               </a:rPr>
-              <a:t>reciever</a:t>
+              <a:t>receiver(</a:t>
             </a:r>
             <a:r>
               <a:rPr lang="en-US" dirty="0">
@@ -4747,7 +5412,7 @@
                 <a:latin typeface="Consolas"/>
                 <a:cs typeface="Consolas"/>
               </a:rPr>
-              <a:t>()</a:t>
+              <a:t>)</a:t>
             </a:r>
             <a:r>
               <a:rPr lang="en-US" dirty="0">
@@ -4763,24 +5428,42 @@
                 <a:latin typeface="Consolas"/>
                 <a:cs typeface="Consolas"/>
               </a:rPr>
-              <a:t> </a:t>
+              <a:t> receive</a:t>
+            </a:r>
+          </a:p>
+          <a:p>
+            <a:r>
+              <a:rPr lang="en-US" dirty="0">
+                <a:latin typeface="Consolas"/>
+                <a:cs typeface="Consolas"/>
+              </a:rPr>
+              <a:t>  </a:t>
             </a:r>
             <a:r>
               <a:rPr lang="en-US" dirty="0" smtClean="0">
                 <a:latin typeface="Consolas"/>
                 <a:cs typeface="Consolas"/>
               </a:rPr>
-              <a:t>receive</a:t>
-            </a:r>
-          </a:p>
-          <a:p>
-            <a:r>
-              <a:rPr lang="en-US" dirty="0" smtClean="0">
-                <a:latin typeface="Consolas"/>
-                <a:cs typeface="Consolas"/>
-              </a:rPr>
-              <a:t>  {  _, Text} -&gt;</a:t>
-            </a:r>
+              <a:t>{</a:t>
+            </a:r>
+            <a:r>
+              <a:rPr lang="en-US" dirty="0" err="1">
+                <a:latin typeface="Consolas"/>
+                <a:cs typeface="Consolas"/>
+              </a:rPr>
+              <a:t>msg</a:t>
+            </a:r>
+            <a:r>
+              <a:rPr lang="en-US" dirty="0">
+                <a:latin typeface="Consolas"/>
+                <a:cs typeface="Consolas"/>
+              </a:rPr>
+              <a:t>, Text} -&gt; </a:t>
+            </a:r>
+            <a:endParaRPr lang="en-US" dirty="0" smtClean="0">
+              <a:latin typeface="Consolas"/>
+              <a:cs typeface="Consolas"/>
+            </a:endParaRPr>
           </a:p>
           <a:p>
             <a:r>
@@ -4822,87 +5505,17 @@
                 <a:latin typeface="Consolas"/>
                 <a:cs typeface="Consolas"/>
               </a:rPr>
-              <a:t>“Eve got message ~s”</a:t>
-            </a:r>
-            <a:r>
-              <a:rPr lang="en-US" dirty="0" smtClean="0">
-                <a:latin typeface="Consolas"/>
-                <a:cs typeface="Consolas"/>
-              </a:rPr>
-              <a:t>, [Text])  </a:t>
-            </a:r>
-            <a:r>
-              <a:rPr lang="en-US" dirty="0" smtClean="0">
+              <a:t>“Message Received: </a:t>
+            </a:r>
+            <a:r>
+              <a:rPr lang="en-US" dirty="0">
                 <a:solidFill>
-                  <a:srgbClr val="2649FF"/>
+                  <a:srgbClr val="00CF18"/>
                 </a:solidFill>
                 <a:latin typeface="Consolas"/>
                 <a:cs typeface="Consolas"/>
               </a:rPr>
-              <a:t>% Eve is nosy</a:t>
-            </a:r>
-            <a:endParaRPr lang="en-US" dirty="0">
-              <a:solidFill>
-                <a:srgbClr val="2649FF"/>
-              </a:solidFill>
-              <a:latin typeface="Consolas"/>
-              <a:cs typeface="Consolas"/>
-            </a:endParaRPr>
-          </a:p>
-          <a:p>
-            <a:r>
-              <a:rPr lang="en-US" dirty="0">
-                <a:latin typeface="Consolas"/>
-                <a:cs typeface="Consolas"/>
-              </a:rPr>
-              <a:t>  </a:t>
-            </a:r>
-            <a:r>
-              <a:rPr lang="en-US" dirty="0" smtClean="0">
-                <a:latin typeface="Consolas"/>
-                <a:cs typeface="Consolas"/>
-              </a:rPr>
-              <a:t>{bob, </a:t>
-            </a:r>
-            <a:r>
-              <a:rPr lang="en-US" dirty="0">
-                <a:latin typeface="Consolas"/>
-                <a:cs typeface="Consolas"/>
-              </a:rPr>
-              <a:t>Text} -&gt; </a:t>
-            </a:r>
-          </a:p>
-          <a:p>
-            <a:r>
-              <a:rPr lang="en-US" dirty="0">
-                <a:latin typeface="Consolas"/>
-                <a:cs typeface="Consolas"/>
-              </a:rPr>
-              <a:t>    </a:t>
-            </a:r>
-            <a:r>
-              <a:rPr lang="en-US" dirty="0" err="1">
-                <a:latin typeface="Consolas"/>
-                <a:cs typeface="Consolas"/>
-              </a:rPr>
-              <a:t>io:</a:t>
-            </a:r>
-            <a:r>
-              <a:rPr lang="en-US" dirty="0" err="1">
-                <a:solidFill>
-                  <a:srgbClr val="F0248D"/>
-                </a:solidFill>
-                <a:latin typeface="Consolas"/>
-                <a:cs typeface="Consolas"/>
-              </a:rPr>
-              <a:t>format</a:t>
-            </a:r>
-            <a:r>
-              <a:rPr lang="en-US" dirty="0" smtClean="0">
-                <a:latin typeface="Consolas"/>
-                <a:cs typeface="Consolas"/>
-              </a:rPr>
-              <a:t>(</a:t>
+              <a:t>~</a:t>
             </a:r>
             <a:r>
               <a:rPr lang="en-US" dirty="0" smtClean="0">
@@ -4912,21 +5525,14 @@
                 <a:latin typeface="Consolas"/>
                 <a:cs typeface="Consolas"/>
               </a:rPr>
-              <a:t>“Bob got message ~s”</a:t>
-            </a:r>
-            <a:r>
-              <a:rPr lang="en-US" dirty="0" smtClean="0">
-                <a:latin typeface="Consolas"/>
-                <a:cs typeface="Consolas"/>
-              </a:rPr>
-              <a:t>, </a:t>
+              <a:t>s"</a:t>
             </a:r>
             <a:r>
               <a:rPr lang="en-US" dirty="0">
                 <a:latin typeface="Consolas"/>
                 <a:cs typeface="Consolas"/>
               </a:rPr>
-              <a:t>[Text])</a:t>
+              <a:t>, [Text])</a:t>
             </a:r>
           </a:p>
           <a:p>
@@ -4946,13 +5552,28 @@
     </p:spTree>
     <p:extLst>
       <p:ext uri="{BB962C8B-B14F-4D97-AF65-F5344CB8AC3E}">
-        <p14:creationId xmlns:p14="http://schemas.microsoft.com/office/powerpoint/2010/main" val="2047579179"/>
+        <p14:creationId xmlns:p14="http://schemas.microsoft.com/office/powerpoint/2010/main" val="721214543"/>
       </p:ext>
     </p:extLst>
   </p:cSld>
   <p:clrMapOvr>
     <a:masterClrMapping/>
   </p:clrMapOvr>
+  <mc:AlternateContent xmlns:mc="http://schemas.openxmlformats.org/markup-compatibility/2006" xmlns:p14="http://schemas.microsoft.com/office/powerpoint/2010/main">
+    <mc:Choice Requires="p14">
+      <p:transition p14:dur="0"/>
+    </mc:Choice>
+    <mc:Fallback xmlns="">
+      <p:transition xmlns:p14="http://schemas.microsoft.com/office/powerpoint/2010/main"/>
+    </mc:Fallback>
+  </mc:AlternateContent>
+  <p:timing>
+    <p:tnLst>
+      <p:par>
+        <p:cTn xmlns:p14="http://schemas.microsoft.com/office/powerpoint/2010/main" id="1" dur="indefinite" restart="never" nodeType="tmRoot"/>
+      </p:par>
+    </p:tnLst>
+  </p:timing>
 </p:sld>
 </file>
 
@@ -4990,7 +5611,7 @@
           <a:p>
             <a:r>
               <a:rPr lang="en-US" dirty="0" smtClean="0"/>
-              <a:t>Preventing Races</a:t>
+              <a:t>Pattern Matching</a:t>
             </a:r>
             <a:endParaRPr lang="en-US" dirty="0"/>
           </a:p>
@@ -5006,9 +5627,16 @@
             <p:ph idx="1"/>
           </p:nvPr>
         </p:nvSpPr>
-        <p:spPr/>
-        <p:txBody>
-          <a:bodyPr/>
+        <p:spPr>
+          <a:xfrm>
+            <a:off x="457199" y="1752600"/>
+            <a:ext cx="8066507" cy="4373563"/>
+          </a:xfrm>
+        </p:spPr>
+        <p:txBody>
+          <a:bodyPr>
+            <a:normAutofit fontScale="92500" lnSpcReduction="20000"/>
+          </a:bodyPr>
           <a:lstStyle/>
           <a:p>
             <a:r>
@@ -5016,41 +5644,292 @@
                 <a:solidFill>
                   <a:srgbClr val="F0248D"/>
                 </a:solidFill>
-              </a:rPr>
-              <a:t>receiver() </a:t>
-            </a:r>
-            <a:r>
-              <a:rPr lang="en-US" dirty="0"/>
-              <a:t>-&gt; </a:t>
-            </a:r>
-          </a:p>
-          <a:p>
-            <a:r>
-              <a:rPr lang="en-US" dirty="0"/>
-              <a:t>  receive</a:t>
-            </a:r>
-          </a:p>
-          <a:p>
-            <a:r>
-              <a:rPr lang="en-US" dirty="0"/>
-              <a:t>    { </a:t>
-            </a:r>
-            <a:r>
-              <a:rPr lang="en-US" dirty="0" err="1"/>
-              <a:t>first_message</a:t>
-            </a:r>
-            <a:r>
-              <a:rPr lang="en-US" dirty="0"/>
-              <a:t> } -&gt; </a:t>
-            </a:r>
-          </a:p>
-          <a:p>
-            <a:r>
-              <a:rPr lang="en-US" dirty="0"/>
-              <a:t>      </a:t>
-            </a:r>
-            <a:r>
-              <a:rPr lang="en-US" dirty="0" err="1"/>
+                <a:latin typeface="Consolas"/>
+                <a:cs typeface="Consolas"/>
+              </a:rPr>
+              <a:t>go()</a:t>
+            </a:r>
+            <a:r>
+              <a:rPr lang="en-US" dirty="0">
+                <a:latin typeface="Consolas"/>
+                <a:cs typeface="Consolas"/>
+              </a:rPr>
+              <a:t>-&gt;</a:t>
+            </a:r>
+          </a:p>
+          <a:p>
+            <a:r>
+              <a:rPr lang="en-US" dirty="0">
+                <a:latin typeface="Consolas"/>
+                <a:cs typeface="Consolas"/>
+              </a:rPr>
+              <a:t> </a:t>
+            </a:r>
+            <a:r>
+              <a:rPr lang="en-US" dirty="0" err="1">
+                <a:latin typeface="Consolas"/>
+                <a:cs typeface="Consolas"/>
+              </a:rPr>
+              <a:t>Pid</a:t>
+            </a:r>
+            <a:r>
+              <a:rPr lang="en-US" dirty="0">
+                <a:latin typeface="Consolas"/>
+                <a:cs typeface="Consolas"/>
+              </a:rPr>
+              <a:t> = </a:t>
+            </a:r>
+            <a:r>
+              <a:rPr lang="en-US" dirty="0">
+                <a:solidFill>
+                  <a:srgbClr val="F0248D"/>
+                </a:solidFill>
+                <a:latin typeface="Consolas"/>
+                <a:cs typeface="Consolas"/>
+              </a:rPr>
+              <a:t>spawn</a:t>
+            </a:r>
+            <a:r>
+              <a:rPr lang="en-US" dirty="0">
+                <a:latin typeface="Consolas"/>
+                <a:cs typeface="Consolas"/>
+              </a:rPr>
+              <a:t>(?MODULE, receiver, []), </a:t>
+            </a:r>
+          </a:p>
+          <a:p>
+            <a:r>
+              <a:rPr lang="en-US" dirty="0">
+                <a:latin typeface="Consolas"/>
+                <a:cs typeface="Consolas"/>
+              </a:rPr>
+              <a:t> </a:t>
+            </a:r>
+            <a:r>
+              <a:rPr lang="en-US" dirty="0" err="1">
+                <a:latin typeface="Consolas"/>
+                <a:cs typeface="Consolas"/>
+              </a:rPr>
+              <a:t>Pid</a:t>
+            </a:r>
+            <a:r>
+              <a:rPr lang="en-US" dirty="0">
+                <a:latin typeface="Consolas"/>
+                <a:cs typeface="Consolas"/>
+              </a:rPr>
+              <a:t> ! </a:t>
+            </a:r>
+            <a:r>
+              <a:rPr lang="en-US" dirty="0" smtClean="0">
+                <a:latin typeface="Consolas"/>
+                <a:cs typeface="Consolas"/>
+              </a:rPr>
+              <a:t>{bob, </a:t>
+            </a:r>
+            <a:r>
+              <a:rPr lang="en-US" dirty="0">
+                <a:solidFill>
+                  <a:srgbClr val="00CF18"/>
+                </a:solidFill>
+                <a:latin typeface="Consolas"/>
+                <a:cs typeface="Consolas"/>
+              </a:rPr>
+              <a:t>"</a:t>
+            </a:r>
+            <a:r>
+              <a:rPr lang="en-US" dirty="0" smtClean="0">
+                <a:solidFill>
+                  <a:srgbClr val="00CF18"/>
+                </a:solidFill>
+                <a:latin typeface="Consolas"/>
+                <a:cs typeface="Consolas"/>
+              </a:rPr>
+              <a:t>Hello </a:t>
+            </a:r>
+            <a:r>
+              <a:rPr lang="en-US" dirty="0">
+                <a:solidFill>
+                  <a:srgbClr val="00CF18"/>
+                </a:solidFill>
+                <a:latin typeface="Consolas"/>
+                <a:cs typeface="Consolas"/>
+              </a:rPr>
+              <a:t>world!"</a:t>
+            </a:r>
+            <a:r>
+              <a:rPr lang="en-US" dirty="0">
+                <a:latin typeface="Consolas"/>
+                <a:cs typeface="Consolas"/>
+              </a:rPr>
+              <a:t>}.</a:t>
+            </a:r>
+          </a:p>
+          <a:p>
+            <a:r>
+              <a:rPr lang="en-US" dirty="0">
+                <a:latin typeface="Consolas"/>
+                <a:cs typeface="Consolas"/>
+              </a:rPr>
+              <a:t>  </a:t>
+            </a:r>
+          </a:p>
+          <a:p>
+            <a:r>
+              <a:rPr lang="en-US" dirty="0" smtClean="0">
+                <a:solidFill>
+                  <a:srgbClr val="F0248D"/>
+                </a:solidFill>
+                <a:latin typeface="Consolas"/>
+                <a:cs typeface="Consolas"/>
+              </a:rPr>
+              <a:t>receiver(</a:t>
+            </a:r>
+            <a:r>
+              <a:rPr lang="en-US" dirty="0">
+                <a:solidFill>
+                  <a:srgbClr val="F0248D"/>
+                </a:solidFill>
+                <a:latin typeface="Consolas"/>
+                <a:cs typeface="Consolas"/>
+              </a:rPr>
+              <a:t>)</a:t>
+            </a:r>
+            <a:r>
+              <a:rPr lang="en-US" dirty="0">
+                <a:latin typeface="Consolas"/>
+                <a:cs typeface="Consolas"/>
+              </a:rPr>
+              <a:t>-&gt;</a:t>
+            </a:r>
+          </a:p>
+          <a:p>
+            <a:r>
+              <a:rPr lang="en-US" dirty="0">
+                <a:latin typeface="Consolas"/>
+                <a:cs typeface="Consolas"/>
+              </a:rPr>
+              <a:t> </a:t>
+            </a:r>
+            <a:r>
+              <a:rPr lang="en-US" dirty="0" smtClean="0">
+                <a:latin typeface="Consolas"/>
+                <a:cs typeface="Consolas"/>
+              </a:rPr>
+              <a:t>receive</a:t>
+            </a:r>
+          </a:p>
+          <a:p>
+            <a:r>
+              <a:rPr lang="en-US" dirty="0" smtClean="0">
+                <a:latin typeface="Consolas"/>
+                <a:cs typeface="Consolas"/>
+              </a:rPr>
+              <a:t>  {  _, Text} -&gt;</a:t>
+            </a:r>
+          </a:p>
+          <a:p>
+            <a:r>
+              <a:rPr lang="en-US" dirty="0" smtClean="0">
+                <a:latin typeface="Consolas"/>
+                <a:cs typeface="Consolas"/>
+              </a:rPr>
+              <a:t>    </a:t>
+            </a:r>
+            <a:r>
+              <a:rPr lang="en-US" dirty="0" err="1" smtClean="0">
+                <a:latin typeface="Consolas"/>
+                <a:cs typeface="Consolas"/>
+              </a:rPr>
+              <a:t>io:</a:t>
+            </a:r>
+            <a:r>
+              <a:rPr lang="en-US" dirty="0" err="1" smtClean="0">
+                <a:solidFill>
+                  <a:srgbClr val="F0248D"/>
+                </a:solidFill>
+                <a:latin typeface="Consolas"/>
+                <a:cs typeface="Consolas"/>
+              </a:rPr>
+              <a:t>format</a:t>
+            </a:r>
+            <a:r>
+              <a:rPr lang="en-US" dirty="0" smtClean="0">
+                <a:latin typeface="Consolas"/>
+                <a:cs typeface="Consolas"/>
+              </a:rPr>
+              <a:t>(</a:t>
+            </a:r>
+            <a:r>
+              <a:rPr lang="en-US" dirty="0" smtClean="0">
+                <a:solidFill>
+                  <a:srgbClr val="00CF18"/>
+                </a:solidFill>
+                <a:latin typeface="Consolas"/>
+                <a:cs typeface="Consolas"/>
+              </a:rPr>
+              <a:t>“Eve got message ~s”</a:t>
+            </a:r>
+            <a:r>
+              <a:rPr lang="en-US" dirty="0" smtClean="0">
+                <a:latin typeface="Consolas"/>
+                <a:cs typeface="Consolas"/>
+              </a:rPr>
+              <a:t>, [Text])  </a:t>
+            </a:r>
+            <a:r>
+              <a:rPr lang="en-US" dirty="0" smtClean="0">
+                <a:solidFill>
+                  <a:srgbClr val="2649FF"/>
+                </a:solidFill>
+                <a:latin typeface="Consolas"/>
+                <a:cs typeface="Consolas"/>
+              </a:rPr>
+              <a:t>% Eve is nosy</a:t>
+            </a:r>
+            <a:endParaRPr lang="en-US" dirty="0">
+              <a:solidFill>
+                <a:srgbClr val="2649FF"/>
+              </a:solidFill>
+              <a:latin typeface="Consolas"/>
+              <a:cs typeface="Consolas"/>
+            </a:endParaRPr>
+          </a:p>
+          <a:p>
+            <a:r>
+              <a:rPr lang="en-US" dirty="0">
+                <a:latin typeface="Consolas"/>
+                <a:cs typeface="Consolas"/>
+              </a:rPr>
+              <a:t>  </a:t>
+            </a:r>
+            <a:r>
+              <a:rPr lang="en-US" dirty="0" smtClean="0">
+                <a:latin typeface="Consolas"/>
+                <a:cs typeface="Consolas"/>
+              </a:rPr>
+              <a:t>{bob, </a:t>
+            </a:r>
+            <a:r>
+              <a:rPr lang="en-US" dirty="0">
+                <a:latin typeface="Consolas"/>
+                <a:cs typeface="Consolas"/>
+              </a:rPr>
+              <a:t>Text} -&gt; </a:t>
+            </a:r>
+          </a:p>
+          <a:p>
+            <a:r>
+              <a:rPr lang="en-US" dirty="0">
+                <a:latin typeface="Consolas"/>
+                <a:cs typeface="Consolas"/>
+              </a:rPr>
+              <a:t>    </a:t>
+            </a:r>
+            <a:r>
+              <a:rPr lang="en-US" dirty="0" err="1">
+                <a:latin typeface="Consolas"/>
+                <a:cs typeface="Consolas"/>
+              </a:rPr>
               <a:t>io:</a:t>
             </a:r>
             <a:r>
@@ -5058,11 +5937,16 @@
                 <a:solidFill>
                   <a:srgbClr val="F0248D"/>
                 </a:solidFill>
+                <a:latin typeface="Consolas"/>
+                <a:cs typeface="Consolas"/>
               </a:rPr>
               <a:t>format</a:t>
             </a:r>
             <a:r>
-              <a:rPr lang="en-US" dirty="0" smtClean="0"/>
+              <a:rPr lang="en-US" dirty="0" smtClean="0">
+                <a:latin typeface="Consolas"/>
+                <a:cs typeface="Consolas"/>
+              </a:rPr>
               <a:t>(</a:t>
             </a:r>
             <a:r>
@@ -5070,102 +5954,33 @@
                 <a:solidFill>
                   <a:srgbClr val="00CF18"/>
                 </a:solidFill>
-              </a:rPr>
-              <a:t>”Got </a:t>
+                <a:latin typeface="Consolas"/>
+                <a:cs typeface="Consolas"/>
+              </a:rPr>
+              <a:t>“Bob got message ~s”</a:t>
+            </a:r>
+            <a:r>
+              <a:rPr lang="en-US" dirty="0" smtClean="0">
+                <a:latin typeface="Consolas"/>
+                <a:cs typeface="Consolas"/>
+              </a:rPr>
+              <a:t>, </a:t>
             </a:r>
             <a:r>
               <a:rPr lang="en-US" dirty="0">
-                <a:solidFill>
-                  <a:srgbClr val="00CF18"/>
-                </a:solidFill>
-              </a:rPr>
-              <a:t>f</a:t>
-            </a:r>
-            <a:r>
-              <a:rPr lang="en-US" dirty="0" smtClean="0">
-                <a:solidFill>
-                  <a:srgbClr val="00CF18"/>
-                </a:solidFill>
-              </a:rPr>
-              <a:t>irst</a:t>
-            </a:r>
+                <a:latin typeface="Consolas"/>
+                <a:cs typeface="Consolas"/>
+              </a:rPr>
+              <a:t>[Text])</a:t>
+            </a:r>
+          </a:p>
+          <a:p>
             <a:r>
               <a:rPr lang="en-US" dirty="0">
-                <a:solidFill>
-                  <a:srgbClr val="00CF18"/>
-                </a:solidFill>
-              </a:rPr>
-              <a:t>"</a:t>
-            </a:r>
-            <a:r>
-              <a:rPr lang="en-US" dirty="0"/>
-              <a:t>)</a:t>
-            </a:r>
-          </a:p>
-          <a:p>
-            <a:r>
-              <a:rPr lang="en-US" dirty="0"/>
-              <a:t>  end,</a:t>
-            </a:r>
-          </a:p>
-          <a:p>
-            <a:r>
-              <a:rPr lang="en-US" dirty="0"/>
-              <a:t>  receive</a:t>
-            </a:r>
-          </a:p>
-          <a:p>
-            <a:r>
-              <a:rPr lang="en-US" dirty="0"/>
-              <a:t>    { </a:t>
-            </a:r>
-            <a:r>
-              <a:rPr lang="en-US" dirty="0" err="1"/>
-              <a:t>second_message</a:t>
-            </a:r>
-            <a:r>
-              <a:rPr lang="en-US" dirty="0"/>
-              <a:t> } -&gt; </a:t>
-            </a:r>
-          </a:p>
-          <a:p>
-            <a:r>
-              <a:rPr lang="en-US" dirty="0"/>
-              <a:t>      </a:t>
-            </a:r>
-            <a:r>
-              <a:rPr lang="en-US" dirty="0" err="1"/>
-              <a:t>io:</a:t>
-            </a:r>
-            <a:r>
-              <a:rPr lang="en-US" dirty="0" err="1">
-                <a:solidFill>
-                  <a:srgbClr val="F0248D"/>
-                </a:solidFill>
-              </a:rPr>
-              <a:t>format</a:t>
-            </a:r>
-            <a:r>
-              <a:rPr lang="en-US" dirty="0" smtClean="0"/>
-              <a:t>(</a:t>
-            </a:r>
-            <a:r>
-              <a:rPr lang="en-US" dirty="0" smtClean="0">
-                <a:solidFill>
-                  <a:srgbClr val="00CF18"/>
-                </a:solidFill>
-              </a:rPr>
-              <a:t>”Got Second"</a:t>
-            </a:r>
-            <a:r>
-              <a:rPr lang="en-US" dirty="0"/>
-              <a:t>)</a:t>
-            </a:r>
-          </a:p>
-          <a:p>
-            <a:r>
-              <a:rPr lang="en-US" dirty="0"/>
-              <a:t>  end.</a:t>
+                <a:latin typeface="Consolas"/>
+                <a:cs typeface="Consolas"/>
+              </a:rPr>
+              <a:t> end.</a:t>
             </a:r>
           </a:p>
           <a:p>
@@ -5176,13 +5991,28 @@
     </p:spTree>
     <p:extLst>
       <p:ext uri="{BB962C8B-B14F-4D97-AF65-F5344CB8AC3E}">
-        <p14:creationId xmlns:p14="http://schemas.microsoft.com/office/powerpoint/2010/main" val="2136989057"/>
+        <p14:creationId xmlns:p14="http://schemas.microsoft.com/office/powerpoint/2010/main" val="2047579179"/>
       </p:ext>
     </p:extLst>
   </p:cSld>
   <p:clrMapOvr>
     <a:masterClrMapping/>
   </p:clrMapOvr>
+  <mc:AlternateContent xmlns:mc="http://schemas.openxmlformats.org/markup-compatibility/2006" xmlns:p14="http://schemas.microsoft.com/office/powerpoint/2010/main">
+    <mc:Choice Requires="p14">
+      <p:transition p14:dur="0"/>
+    </mc:Choice>
+    <mc:Fallback xmlns="">
+      <p:transition xmlns:p14="http://schemas.microsoft.com/office/powerpoint/2010/main"/>
+    </mc:Fallback>
+  </mc:AlternateContent>
+  <p:timing>
+    <p:tnLst>
+      <p:par>
+        <p:cTn xmlns:p14="http://schemas.microsoft.com/office/powerpoint/2010/main" id="1" dur="indefinite" restart="never" nodeType="tmRoot"/>
+      </p:par>
+    </p:tnLst>
+  </p:timing>
 </p:sld>
 </file>
 
@@ -5220,7 +6050,7 @@
           <a:p>
             <a:r>
               <a:rPr lang="en-US" dirty="0" smtClean="0"/>
-              <a:t>Tuple Space</a:t>
+              <a:t>Preventing Races</a:t>
             </a:r>
             <a:endParaRPr lang="en-US" dirty="0"/>
           </a:p>
@@ -5238,84 +6068,196 @@
         </p:nvSpPr>
         <p:spPr/>
         <p:txBody>
-          <a:bodyPr>
-            <a:normAutofit/>
-          </a:bodyPr>
-          <a:lstStyle/>
-          <a:p>
-            <a:pPr marL="342900" indent="-342900">
-              <a:buFont typeface="Arial"/>
-              <a:buChar char="•"/>
-            </a:pPr>
-            <a:r>
-              <a:rPr lang="en-US" sz="2500" dirty="0" smtClean="0">
-                <a:latin typeface="Calibri"/>
-                <a:cs typeface="Calibri"/>
-              </a:rPr>
-              <a:t>A safe, shared data space for threads</a:t>
-            </a:r>
-          </a:p>
-          <a:p>
-            <a:pPr marL="342900" indent="-342900">
-              <a:buFont typeface="Arial"/>
-              <a:buChar char="•"/>
-            </a:pPr>
-            <a:r>
-              <a:rPr lang="en-US" sz="2500" dirty="0" smtClean="0">
-                <a:latin typeface="Calibri"/>
-                <a:cs typeface="Calibri"/>
-              </a:rPr>
-              <a:t>Producer/consumer model</a:t>
-            </a:r>
-          </a:p>
-          <a:p>
-            <a:pPr marL="342900" indent="-342900">
-              <a:buFont typeface="Arial"/>
-              <a:buChar char="•"/>
-            </a:pPr>
-            <a:r>
-              <a:rPr lang="en-US" sz="2500" dirty="0" smtClean="0">
-                <a:latin typeface="Calibri"/>
-                <a:cs typeface="Calibri"/>
-              </a:rPr>
-              <a:t>Actors can add/remove elements atomically</a:t>
-            </a:r>
-          </a:p>
-          <a:p>
-            <a:pPr marL="342900" indent="-342900">
-              <a:buFont typeface="Arial"/>
-              <a:buChar char="•"/>
-            </a:pPr>
-            <a:r>
-              <a:rPr lang="en-US" sz="2500" dirty="0" smtClean="0">
-                <a:latin typeface="Calibri"/>
-                <a:cs typeface="Calibri"/>
-              </a:rPr>
-              <a:t>Guarantee no element can be removed twice</a:t>
-            </a:r>
-          </a:p>
-          <a:p>
-            <a:pPr marL="342900" indent="-342900">
-              <a:buFont typeface="Arial"/>
-              <a:buChar char="•"/>
-            </a:pPr>
-            <a:endParaRPr lang="en-US" sz="2500" dirty="0">
-              <a:latin typeface="Calibri"/>
-              <a:cs typeface="Calibri"/>
-            </a:endParaRPr>
+          <a:bodyPr/>
+          <a:lstStyle/>
+          <a:p>
+            <a:r>
+              <a:rPr lang="en-US" dirty="0">
+                <a:solidFill>
+                  <a:srgbClr val="F0248D"/>
+                </a:solidFill>
+              </a:rPr>
+              <a:t>receiver() </a:t>
+            </a:r>
+            <a:r>
+              <a:rPr lang="en-US" dirty="0"/>
+              <a:t>-&gt; </a:t>
+            </a:r>
+          </a:p>
+          <a:p>
+            <a:r>
+              <a:rPr lang="en-US" dirty="0"/>
+              <a:t>  receive</a:t>
+            </a:r>
+          </a:p>
+          <a:p>
+            <a:r>
+              <a:rPr lang="en-US" dirty="0"/>
+              <a:t>    { </a:t>
+            </a:r>
+            <a:r>
+              <a:rPr lang="en-US" dirty="0" err="1"/>
+              <a:t>first_message</a:t>
+            </a:r>
+            <a:r>
+              <a:rPr lang="en-US" dirty="0"/>
+              <a:t> } -&gt; </a:t>
+            </a:r>
+          </a:p>
+          <a:p>
+            <a:r>
+              <a:rPr lang="en-US" dirty="0"/>
+              <a:t>      </a:t>
+            </a:r>
+            <a:r>
+              <a:rPr lang="en-US" dirty="0" err="1"/>
+              <a:t>io:</a:t>
+            </a:r>
+            <a:r>
+              <a:rPr lang="en-US" dirty="0" err="1">
+                <a:solidFill>
+                  <a:srgbClr val="F0248D"/>
+                </a:solidFill>
+              </a:rPr>
+              <a:t>format</a:t>
+            </a:r>
+            <a:r>
+              <a:rPr lang="en-US" dirty="0" smtClean="0"/>
+              <a:t>(</a:t>
+            </a:r>
+            <a:r>
+              <a:rPr lang="en-US" dirty="0" smtClean="0">
+                <a:solidFill>
+                  <a:srgbClr val="00CF18"/>
+                </a:solidFill>
+              </a:rPr>
+              <a:t>”Got </a:t>
+            </a:r>
+            <a:r>
+              <a:rPr lang="en-US" dirty="0">
+                <a:solidFill>
+                  <a:srgbClr val="00CF18"/>
+                </a:solidFill>
+              </a:rPr>
+              <a:t>f</a:t>
+            </a:r>
+            <a:r>
+              <a:rPr lang="en-US" dirty="0" smtClean="0">
+                <a:solidFill>
+                  <a:srgbClr val="00CF18"/>
+                </a:solidFill>
+              </a:rPr>
+              <a:t>irst</a:t>
+            </a:r>
+            <a:r>
+              <a:rPr lang="en-US" dirty="0">
+                <a:solidFill>
+                  <a:srgbClr val="00CF18"/>
+                </a:solidFill>
+              </a:rPr>
+              <a:t>"</a:t>
+            </a:r>
+            <a:r>
+              <a:rPr lang="en-US" dirty="0"/>
+              <a:t>)</a:t>
+            </a:r>
+          </a:p>
+          <a:p>
+            <a:r>
+              <a:rPr lang="en-US" dirty="0"/>
+              <a:t>  end,</a:t>
+            </a:r>
+          </a:p>
+          <a:p>
+            <a:r>
+              <a:rPr lang="en-US" dirty="0"/>
+              <a:t>  receive</a:t>
+            </a:r>
+          </a:p>
+          <a:p>
+            <a:r>
+              <a:rPr lang="en-US" dirty="0"/>
+              <a:t>    { </a:t>
+            </a:r>
+            <a:r>
+              <a:rPr lang="en-US" dirty="0" err="1"/>
+              <a:t>second_message</a:t>
+            </a:r>
+            <a:r>
+              <a:rPr lang="en-US" dirty="0"/>
+              <a:t> } -&gt; </a:t>
+            </a:r>
+          </a:p>
+          <a:p>
+            <a:r>
+              <a:rPr lang="en-US" dirty="0"/>
+              <a:t>      </a:t>
+            </a:r>
+            <a:r>
+              <a:rPr lang="en-US" dirty="0" err="1"/>
+              <a:t>io:</a:t>
+            </a:r>
+            <a:r>
+              <a:rPr lang="en-US" dirty="0" err="1">
+                <a:solidFill>
+                  <a:srgbClr val="F0248D"/>
+                </a:solidFill>
+              </a:rPr>
+              <a:t>format</a:t>
+            </a:r>
+            <a:r>
+              <a:rPr lang="en-US" dirty="0" smtClean="0"/>
+              <a:t>(</a:t>
+            </a:r>
+            <a:r>
+              <a:rPr lang="en-US" dirty="0" smtClean="0">
+                <a:solidFill>
+                  <a:srgbClr val="00CF18"/>
+                </a:solidFill>
+              </a:rPr>
+              <a:t>”Got Second"</a:t>
+            </a:r>
+            <a:r>
+              <a:rPr lang="en-US" dirty="0"/>
+              <a:t>)</a:t>
+            </a:r>
+          </a:p>
+          <a:p>
+            <a:r>
+              <a:rPr lang="en-US" dirty="0"/>
+              <a:t>  end.</a:t>
+            </a:r>
+          </a:p>
+          <a:p>
+            <a:endParaRPr lang="en-US" dirty="0"/>
           </a:p>
         </p:txBody>
       </p:sp>
     </p:spTree>
     <p:extLst>
       <p:ext uri="{BB962C8B-B14F-4D97-AF65-F5344CB8AC3E}">
-        <p14:creationId xmlns:p14="http://schemas.microsoft.com/office/powerpoint/2010/main" val="3109331382"/>
+        <p14:creationId xmlns:p14="http://schemas.microsoft.com/office/powerpoint/2010/main" val="2136989057"/>
       </p:ext>
     </p:extLst>
   </p:cSld>
   <p:clrMapOvr>
     <a:masterClrMapping/>
   </p:clrMapOvr>
+  <mc:AlternateContent xmlns:mc="http://schemas.openxmlformats.org/markup-compatibility/2006" xmlns:p14="http://schemas.microsoft.com/office/powerpoint/2010/main">
+    <mc:Choice Requires="p14">
+      <p:transition p14:dur="0"/>
+    </mc:Choice>
+    <mc:Fallback xmlns="">
+      <p:transition xmlns:p14="http://schemas.microsoft.com/office/powerpoint/2010/main"/>
+    </mc:Fallback>
+  </mc:AlternateContent>
+  <p:timing>
+    <p:tnLst>
+      <p:par>
+        <p:cTn xmlns:p14="http://schemas.microsoft.com/office/powerpoint/2010/main" id="1" dur="indefinite" restart="never" nodeType="tmRoot"/>
+      </p:par>
+    </p:tnLst>
+  </p:timing>
 </p:sld>
 </file>
 

</xml_diff>

<commit_message>
Updated the project abstract document to include more information about pattern matching, actors, scheduling and other erlang internals.
</commit_message>
<xml_diff>
--- a/Presentation.pptx
+++ b/Presentation.pptx
@@ -312,7 +312,7 @@
             <a:fld id="{451DEABC-D766-4322-8E78-B830FAE35C72}" type="datetime4">
               <a:rPr lang="en-US" smtClean="0"/>
               <a:pPr/>
-              <a:t>April 28, 2012</a:t>
+              <a:t>April 29, 2012</a:t>
             </a:fld>
             <a:endParaRPr lang="en-US" dirty="0"/>
           </a:p>
@@ -466,12 +466,12 @@
   <p:clrMapOvr>
     <a:masterClrMapping/>
   </p:clrMapOvr>
-  <mc:AlternateContent xmlns:mc="http://schemas.openxmlformats.org/markup-compatibility/2006" xmlns:p14="http://schemas.microsoft.com/office/powerpoint/2010/main">
-    <mc:Choice Requires="p14">
+  <mc:AlternateContent xmlns:mc="http://schemas.openxmlformats.org/markup-compatibility/2006">
+    <mc:Choice xmlns:p14="http://schemas.microsoft.com/office/powerpoint/2010/main" Requires="p14">
       <p:transition p14:dur="0"/>
     </mc:Choice>
-    <mc:Fallback xmlns="">
-      <p:transition xmlns:p14="http://schemas.microsoft.com/office/powerpoint/2010/main"/>
+    <mc:Fallback>
+      <p:transition/>
     </mc:Fallback>
   </mc:AlternateContent>
 </p:sldLayout>
@@ -587,7 +587,7 @@
             <a:fld id="{F3131F9E-604E-4343-9F29-EF72E8231CAD}" type="datetime4">
               <a:rPr lang="en-US" smtClean="0"/>
               <a:pPr/>
-              <a:t>April 28, 2012</a:t>
+              <a:t>April 29, 2012</a:t>
             </a:fld>
             <a:endParaRPr lang="en-US"/>
           </a:p>
@@ -641,12 +641,12 @@
   <p:clrMapOvr>
     <a:masterClrMapping/>
   </p:clrMapOvr>
-  <mc:AlternateContent xmlns:mc="http://schemas.openxmlformats.org/markup-compatibility/2006" xmlns:p14="http://schemas.microsoft.com/office/powerpoint/2010/main">
-    <mc:Choice Requires="p14">
+  <mc:AlternateContent xmlns:mc="http://schemas.openxmlformats.org/markup-compatibility/2006">
+    <mc:Choice xmlns:p14="http://schemas.microsoft.com/office/powerpoint/2010/main" Requires="p14">
       <p:transition p14:dur="0"/>
     </mc:Choice>
-    <mc:Fallback xmlns="">
-      <p:transition xmlns:p14="http://schemas.microsoft.com/office/powerpoint/2010/main"/>
+    <mc:Fallback>
+      <p:transition/>
     </mc:Fallback>
   </mc:AlternateContent>
 </p:sldLayout>
@@ -772,7 +772,7 @@
             <a:fld id="{34A8E1CE-37F8-4102-8DF9-852A0A51F293}" type="datetime4">
               <a:rPr lang="en-US" smtClean="0"/>
               <a:pPr/>
-              <a:t>April 28, 2012</a:t>
+              <a:t>April 29, 2012</a:t>
             </a:fld>
             <a:endParaRPr lang="en-US"/>
           </a:p>
@@ -826,12 +826,12 @@
   <p:clrMapOvr>
     <a:masterClrMapping/>
   </p:clrMapOvr>
-  <mc:AlternateContent xmlns:mc="http://schemas.openxmlformats.org/markup-compatibility/2006" xmlns:p14="http://schemas.microsoft.com/office/powerpoint/2010/main">
-    <mc:Choice Requires="p14">
+  <mc:AlternateContent xmlns:mc="http://schemas.openxmlformats.org/markup-compatibility/2006">
+    <mc:Choice xmlns:p14="http://schemas.microsoft.com/office/powerpoint/2010/main" Requires="p14">
       <p:transition p14:dur="0"/>
     </mc:Choice>
-    <mc:Fallback xmlns="">
-      <p:transition xmlns:p14="http://schemas.microsoft.com/office/powerpoint/2010/main"/>
+    <mc:Fallback>
+      <p:transition/>
     </mc:Fallback>
   </mc:AlternateContent>
 </p:sldLayout>
@@ -947,7 +947,7 @@
             <a:fld id="{93333F43-3E86-47E4-BFBB-2476D384E1C6}" type="datetime4">
               <a:rPr lang="en-US" smtClean="0"/>
               <a:pPr/>
-              <a:t>April 28, 2012</a:t>
+              <a:t>April 29, 2012</a:t>
             </a:fld>
             <a:endParaRPr lang="en-US"/>
           </a:p>
@@ -1001,12 +1001,12 @@
   <p:clrMapOvr>
     <a:masterClrMapping/>
   </p:clrMapOvr>
-  <mc:AlternateContent xmlns:mc="http://schemas.openxmlformats.org/markup-compatibility/2006" xmlns:p14="http://schemas.microsoft.com/office/powerpoint/2010/main">
-    <mc:Choice Requires="p14">
+  <mc:AlternateContent xmlns:mc="http://schemas.openxmlformats.org/markup-compatibility/2006">
+    <mc:Choice xmlns:p14="http://schemas.microsoft.com/office/powerpoint/2010/main" Requires="p14">
       <p:transition p14:dur="0"/>
     </mc:Choice>
-    <mc:Fallback xmlns="">
-      <p:transition xmlns:p14="http://schemas.microsoft.com/office/powerpoint/2010/main"/>
+    <mc:Fallback>
+      <p:transition/>
     </mc:Fallback>
   </mc:AlternateContent>
 </p:sldLayout>
@@ -1206,7 +1206,7 @@
             <a:fld id="{751663BA-01FC-4367-B6F3-ABB2645D55F1}" type="datetime4">
               <a:rPr lang="en-US" smtClean="0"/>
               <a:pPr/>
-              <a:t>April 28, 2012</a:t>
+              <a:t>April 29, 2012</a:t>
             </a:fld>
             <a:endParaRPr lang="en-US" dirty="0"/>
           </a:p>
@@ -1260,12 +1260,12 @@
   <p:clrMapOvr>
     <a:masterClrMapping/>
   </p:clrMapOvr>
-  <mc:AlternateContent xmlns:mc="http://schemas.openxmlformats.org/markup-compatibility/2006" xmlns:p14="http://schemas.microsoft.com/office/powerpoint/2010/main">
-    <mc:Choice Requires="p14">
+  <mc:AlternateContent xmlns:mc="http://schemas.openxmlformats.org/markup-compatibility/2006">
+    <mc:Choice xmlns:p14="http://schemas.microsoft.com/office/powerpoint/2010/main" Requires="p14">
       <p:transition p14:dur="0"/>
     </mc:Choice>
-    <mc:Fallback xmlns="">
-      <p:transition xmlns:p14="http://schemas.microsoft.com/office/powerpoint/2010/main"/>
+    <mc:Fallback>
+      <p:transition/>
     </mc:Fallback>
   </mc:AlternateContent>
 </p:sldLayout>
@@ -1499,7 +1499,7 @@
             <a:fld id="{79B19C71-EC74-44AF-B27E-FC7DC3C3A61D}" type="datetime4">
               <a:rPr lang="en-US" smtClean="0"/>
               <a:pPr/>
-              <a:t>April 28, 2012</a:t>
+              <a:t>April 29, 2012</a:t>
             </a:fld>
             <a:endParaRPr lang="en-US"/>
           </a:p>
@@ -1553,12 +1553,12 @@
   <p:clrMapOvr>
     <a:masterClrMapping/>
   </p:clrMapOvr>
-  <mc:AlternateContent xmlns:mc="http://schemas.openxmlformats.org/markup-compatibility/2006" xmlns:p14="http://schemas.microsoft.com/office/powerpoint/2010/main">
-    <mc:Choice Requires="p14">
+  <mc:AlternateContent xmlns:mc="http://schemas.openxmlformats.org/markup-compatibility/2006">
+    <mc:Choice xmlns:p14="http://schemas.microsoft.com/office/powerpoint/2010/main" Requires="p14">
       <p:transition p14:dur="0"/>
     </mc:Choice>
-    <mc:Fallback xmlns="">
-      <p:transition xmlns:p14="http://schemas.microsoft.com/office/powerpoint/2010/main"/>
+    <mc:Fallback>
+      <p:transition/>
     </mc:Fallback>
   </mc:AlternateContent>
 </p:sldLayout>
@@ -1948,7 +1948,7 @@
             <a:fld id="{6A5CDA29-3CBE-48EA-92AE-A996835462BA}" type="datetime4">
               <a:rPr lang="en-US" smtClean="0"/>
               <a:pPr/>
-              <a:t>April 28, 2012</a:t>
+              <a:t>April 29, 2012</a:t>
             </a:fld>
             <a:endParaRPr lang="en-US"/>
           </a:p>
@@ -2002,12 +2002,12 @@
   <p:clrMapOvr>
     <a:masterClrMapping/>
   </p:clrMapOvr>
-  <mc:AlternateContent xmlns:mc="http://schemas.openxmlformats.org/markup-compatibility/2006" xmlns:p14="http://schemas.microsoft.com/office/powerpoint/2010/main">
-    <mc:Choice Requires="p14">
+  <mc:AlternateContent xmlns:mc="http://schemas.openxmlformats.org/markup-compatibility/2006">
+    <mc:Choice xmlns:p14="http://schemas.microsoft.com/office/powerpoint/2010/main" Requires="p14">
       <p:transition p14:dur="0"/>
     </mc:Choice>
-    <mc:Fallback xmlns="">
-      <p:transition xmlns:p14="http://schemas.microsoft.com/office/powerpoint/2010/main"/>
+    <mc:Fallback>
+      <p:transition/>
     </mc:Fallback>
   </mc:AlternateContent>
 </p:sldLayout>
@@ -2071,7 +2071,7 @@
             <a:fld id="{E29EC054-3869-4501-B163-1BBFDE8DCE04}" type="datetime4">
               <a:rPr lang="en-US" smtClean="0"/>
               <a:pPr/>
-              <a:t>April 28, 2012</a:t>
+              <a:t>April 29, 2012</a:t>
             </a:fld>
             <a:endParaRPr lang="en-US"/>
           </a:p>
@@ -2125,12 +2125,12 @@
   <p:clrMapOvr>
     <a:masterClrMapping/>
   </p:clrMapOvr>
-  <mc:AlternateContent xmlns:mc="http://schemas.openxmlformats.org/markup-compatibility/2006" xmlns:p14="http://schemas.microsoft.com/office/powerpoint/2010/main">
-    <mc:Choice Requires="p14">
+  <mc:AlternateContent xmlns:mc="http://schemas.openxmlformats.org/markup-compatibility/2006">
+    <mc:Choice xmlns:p14="http://schemas.microsoft.com/office/powerpoint/2010/main" Requires="p14">
       <p:transition p14:dur="0"/>
     </mc:Choice>
-    <mc:Fallback xmlns="">
-      <p:transition xmlns:p14="http://schemas.microsoft.com/office/powerpoint/2010/main"/>
+    <mc:Fallback>
+      <p:transition/>
     </mc:Fallback>
   </mc:AlternateContent>
 </p:sldLayout>
@@ -2171,7 +2171,7 @@
             <a:fld id="{0A63D831-56C1-49CF-8EF7-8B9A98402BCD}" type="datetime4">
               <a:rPr lang="en-US" smtClean="0"/>
               <a:pPr/>
-              <a:t>April 28, 2012</a:t>
+              <a:t>April 29, 2012</a:t>
             </a:fld>
             <a:endParaRPr lang="en-US"/>
           </a:p>
@@ -2225,12 +2225,12 @@
   <p:clrMapOvr>
     <a:masterClrMapping/>
   </p:clrMapOvr>
-  <mc:AlternateContent xmlns:mc="http://schemas.openxmlformats.org/markup-compatibility/2006" xmlns:p14="http://schemas.microsoft.com/office/powerpoint/2010/main">
-    <mc:Choice Requires="p14">
+  <mc:AlternateContent xmlns:mc="http://schemas.openxmlformats.org/markup-compatibility/2006">
+    <mc:Choice xmlns:p14="http://schemas.microsoft.com/office/powerpoint/2010/main" Requires="p14">
       <p:transition p14:dur="0"/>
     </mc:Choice>
-    <mc:Fallback xmlns="">
-      <p:transition xmlns:p14="http://schemas.microsoft.com/office/powerpoint/2010/main"/>
+    <mc:Fallback>
+      <p:transition/>
     </mc:Fallback>
   </mc:AlternateContent>
 </p:sldLayout>
@@ -2423,7 +2423,7 @@
             <a:fld id="{6EAD5615-7F4F-4584-84D5-CC95918C321F}" type="datetime4">
               <a:rPr lang="en-US" smtClean="0"/>
               <a:pPr/>
-              <a:t>April 28, 2012</a:t>
+              <a:t>April 29, 2012</a:t>
             </a:fld>
             <a:endParaRPr lang="en-US"/>
           </a:p>
@@ -2500,12 +2500,12 @@
   <p:clrMapOvr>
     <a:masterClrMapping/>
   </p:clrMapOvr>
-  <mc:AlternateContent xmlns:mc="http://schemas.openxmlformats.org/markup-compatibility/2006" xmlns:p14="http://schemas.microsoft.com/office/powerpoint/2010/main">
-    <mc:Choice Requires="p14">
+  <mc:AlternateContent xmlns:mc="http://schemas.openxmlformats.org/markup-compatibility/2006">
+    <mc:Choice xmlns:p14="http://schemas.microsoft.com/office/powerpoint/2010/main" Requires="p14">
       <p:transition p14:dur="0"/>
     </mc:Choice>
-    <mc:Fallback xmlns="">
-      <p:transition xmlns:p14="http://schemas.microsoft.com/office/powerpoint/2010/main"/>
+    <mc:Fallback>
+      <p:transition/>
     </mc:Fallback>
   </mc:AlternateContent>
 </p:sldLayout>
@@ -2727,7 +2727,7 @@
             <a:fld id="{76EEA923-9BEE-48CE-9F28-5B525F399BAD}" type="datetime4">
               <a:rPr lang="en-US" smtClean="0"/>
               <a:pPr/>
-              <a:t>April 28, 2012</a:t>
+              <a:t>April 29, 2012</a:t>
             </a:fld>
             <a:endParaRPr lang="en-US"/>
           </a:p>
@@ -2869,12 +2869,12 @@
   <p:clrMapOvr>
     <a:masterClrMapping/>
   </p:clrMapOvr>
-  <mc:AlternateContent xmlns:mc="http://schemas.openxmlformats.org/markup-compatibility/2006" xmlns:p14="http://schemas.microsoft.com/office/powerpoint/2010/main">
-    <mc:Choice Requires="p14">
+  <mc:AlternateContent xmlns:mc="http://schemas.openxmlformats.org/markup-compatibility/2006">
+    <mc:Choice xmlns:p14="http://schemas.microsoft.com/office/powerpoint/2010/main" Requires="p14">
       <p:transition p14:dur="0"/>
     </mc:Choice>
-    <mc:Fallback xmlns="">
-      <p:transition xmlns:p14="http://schemas.microsoft.com/office/powerpoint/2010/main"/>
+    <mc:Fallback>
+      <p:transition/>
     </mc:Fallback>
   </mc:AlternateContent>
 </p:sldLayout>
@@ -3031,7 +3031,7 @@
             <a:fld id="{17D0EFEE-2756-4A20-BF2A-63F0A94F99AC}" type="datetime4">
               <a:rPr lang="en-US" smtClean="0"/>
               <a:pPr/>
-              <a:t>April 28, 2012</a:t>
+              <a:t>April 29, 2012</a:t>
             </a:fld>
             <a:endParaRPr lang="en-US" dirty="0"/>
           </a:p>
@@ -3220,12 +3220,12 @@
     <p:sldLayoutId id="2147483922" r:id="rId10"/>
     <p:sldLayoutId id="2147483923" r:id="rId11"/>
   </p:sldLayoutIdLst>
-  <mc:AlternateContent xmlns:mc="http://schemas.openxmlformats.org/markup-compatibility/2006" xmlns:p14="http://schemas.microsoft.com/office/powerpoint/2010/main">
-    <mc:Choice Requires="p14">
+  <mc:AlternateContent xmlns:mc="http://schemas.openxmlformats.org/markup-compatibility/2006">
+    <mc:Choice xmlns:p14="http://schemas.microsoft.com/office/powerpoint/2010/main" Requires="p14">
       <p:transition p14:dur="0"/>
     </mc:Choice>
-    <mc:Fallback xmlns="">
-      <p:transition xmlns:p14="http://schemas.microsoft.com/office/powerpoint/2010/main"/>
+    <mc:Fallback>
+      <p:transition/>
     </mc:Fallback>
   </mc:AlternateContent>
   <p:hf sldNum="0" hdr="0" ftr="0" dt="0"/>
@@ -3543,11 +3543,7 @@
           <a:p>
             <a:r>
               <a:rPr lang="en-US" dirty="0" smtClean="0"/>
-              <a:t>MESSAGE </a:t>
-            </a:r>
-            <a:r>
-              <a:rPr lang="en-US" dirty="0" smtClean="0"/>
-              <a:t>PASSING WITH ERLANG</a:t>
+              <a:t>MESSAGE PASSING WITH ERLANG</a:t>
             </a:r>
             <a:endParaRPr lang="en-US" dirty="0"/>
           </a:p>
@@ -3609,18 +3605,18 @@
   <p:clrMapOvr>
     <a:masterClrMapping/>
   </p:clrMapOvr>
-  <mc:AlternateContent xmlns:mc="http://schemas.openxmlformats.org/markup-compatibility/2006" xmlns:p14="http://schemas.microsoft.com/office/powerpoint/2010/main">
-    <mc:Choice Requires="p14">
+  <mc:AlternateContent xmlns:mc="http://schemas.openxmlformats.org/markup-compatibility/2006">
+    <mc:Choice xmlns:p14="http://schemas.microsoft.com/office/powerpoint/2010/main" Requires="p14">
       <p:transition p14:dur="0"/>
     </mc:Choice>
-    <mc:Fallback xmlns="">
-      <p:transition xmlns:p14="http://schemas.microsoft.com/office/powerpoint/2010/main"/>
+    <mc:Fallback>
+      <p:transition/>
     </mc:Fallback>
   </mc:AlternateContent>
   <p:timing>
     <p:tnLst>
       <p:par>
-        <p:cTn xmlns:p14="http://schemas.microsoft.com/office/powerpoint/2010/main" id="1" dur="indefinite" restart="never" nodeType="tmRoot"/>
+        <p:cTn id="1" dur="indefinite" restart="never" nodeType="tmRoot"/>
       </p:par>
     </p:tnLst>
   </p:timing>
@@ -3757,12 +3753,12 @@
   <p:clrMapOvr>
     <a:masterClrMapping/>
   </p:clrMapOvr>
-  <mc:AlternateContent xmlns:mc="http://schemas.openxmlformats.org/markup-compatibility/2006" xmlns:p14="http://schemas.microsoft.com/office/powerpoint/2010/main">
-    <mc:Choice Requires="p14">
+  <mc:AlternateContent xmlns:mc="http://schemas.openxmlformats.org/markup-compatibility/2006">
+    <mc:Choice xmlns:p14="http://schemas.microsoft.com/office/powerpoint/2010/main" Requires="p14">
       <p:transition p14:dur="0"/>
     </mc:Choice>
-    <mc:Fallback xmlns="">
-      <p:transition xmlns:p14="http://schemas.microsoft.com/office/powerpoint/2010/main"/>
+    <mc:Fallback>
+      <p:transition/>
     </mc:Fallback>
   </mc:AlternateContent>
 </p:sld>
@@ -3967,12 +3963,12 @@
   <p:clrMapOvr>
     <a:masterClrMapping/>
   </p:clrMapOvr>
-  <mc:AlternateContent xmlns:mc="http://schemas.openxmlformats.org/markup-compatibility/2006" xmlns:p14="http://schemas.microsoft.com/office/powerpoint/2010/main">
-    <mc:Choice Requires="p14">
+  <mc:AlternateContent xmlns:mc="http://schemas.openxmlformats.org/markup-compatibility/2006">
+    <mc:Choice xmlns:p14="http://schemas.microsoft.com/office/powerpoint/2010/main" Requires="p14">
       <p:transition p14:dur="0"/>
     </mc:Choice>
-    <mc:Fallback xmlns="">
-      <p:transition xmlns:p14="http://schemas.microsoft.com/office/powerpoint/2010/main"/>
+    <mc:Fallback>
+      <p:transition/>
     </mc:Fallback>
   </mc:AlternateContent>
 </p:sld>
@@ -4206,12 +4202,12 @@
   <p:clrMapOvr>
     <a:masterClrMapping/>
   </p:clrMapOvr>
-  <mc:AlternateContent xmlns:mc="http://schemas.openxmlformats.org/markup-compatibility/2006" xmlns:p14="http://schemas.microsoft.com/office/powerpoint/2010/main">
-    <mc:Choice Requires="p14">
+  <mc:AlternateContent xmlns:mc="http://schemas.openxmlformats.org/markup-compatibility/2006">
+    <mc:Choice xmlns:p14="http://schemas.microsoft.com/office/powerpoint/2010/main" Requires="p14">
       <p:transition p14:dur="0"/>
     </mc:Choice>
-    <mc:Fallback xmlns="">
-      <p:transition xmlns:p14="http://schemas.microsoft.com/office/powerpoint/2010/main"/>
+    <mc:Fallback>
+      <p:transition/>
     </mc:Fallback>
   </mc:AlternateContent>
 </p:sld>
@@ -4328,18 +4324,18 @@
   <p:clrMapOvr>
     <a:masterClrMapping/>
   </p:clrMapOvr>
-  <mc:AlternateContent xmlns:mc="http://schemas.openxmlformats.org/markup-compatibility/2006" xmlns:p14="http://schemas.microsoft.com/office/powerpoint/2010/main">
-    <mc:Choice Requires="p14">
+  <mc:AlternateContent xmlns:mc="http://schemas.openxmlformats.org/markup-compatibility/2006">
+    <mc:Choice xmlns:p14="http://schemas.microsoft.com/office/powerpoint/2010/main" Requires="p14">
       <p:transition p14:dur="0"/>
     </mc:Choice>
-    <mc:Fallback xmlns="">
-      <p:transition xmlns:p14="http://schemas.microsoft.com/office/powerpoint/2010/main"/>
+    <mc:Fallback>
+      <p:transition/>
     </mc:Fallback>
   </mc:AlternateContent>
   <p:timing>
     <p:tnLst>
       <p:par>
-        <p:cTn xmlns:p14="http://schemas.microsoft.com/office/powerpoint/2010/main" id="1" dur="indefinite" restart="never" nodeType="tmRoot"/>
+        <p:cTn id="1" dur="indefinite" restart="never" nodeType="tmRoot"/>
       </p:par>
     </p:tnLst>
   </p:timing>
@@ -4423,19 +4419,8 @@
                 <a:latin typeface="Calibri"/>
                 <a:cs typeface="Calibri"/>
               </a:rPr>
-              <a:t>Dynamically </a:t>
-            </a:r>
-            <a:r>
-              <a:rPr lang="en-US" sz="2500" dirty="0" err="1" smtClean="0">
-                <a:latin typeface="Calibri"/>
-                <a:cs typeface="Calibri"/>
-              </a:rPr>
-              <a:t>typed</a:t>
-            </a:r>
-            <a:endParaRPr lang="en-US" sz="2500" dirty="0" smtClean="0">
-              <a:latin typeface="Calibri"/>
-              <a:cs typeface="Calibri"/>
-            </a:endParaRPr>
+              <a:t>Dynamically typed</a:t>
+            </a:r>
           </a:p>
           <a:p>
             <a:pPr marL="342900" indent="-342900">
@@ -4447,14 +4432,7 @@
                 <a:latin typeface="Calibri"/>
                 <a:cs typeface="Calibri"/>
               </a:rPr>
-              <a:t>Semi </a:t>
-            </a:r>
-            <a:r>
-              <a:rPr lang="en-US" sz="2500" dirty="0" smtClean="0">
-                <a:latin typeface="Calibri"/>
-                <a:cs typeface="Calibri"/>
-              </a:rPr>
-              <a:t>garbage collected</a:t>
+              <a:t>Semi garbage collected</a:t>
             </a:r>
           </a:p>
           <a:p>
@@ -4467,14 +4445,7 @@
                 <a:latin typeface="Calibri"/>
                 <a:cs typeface="Calibri"/>
               </a:rPr>
-              <a:t>Uses the actor </a:t>
-            </a:r>
-            <a:r>
-              <a:rPr lang="en-US" sz="2500" dirty="0" smtClean="0">
-                <a:latin typeface="Calibri"/>
-                <a:cs typeface="Calibri"/>
-              </a:rPr>
-              <a:t>model</a:t>
+              <a:t>Uses the actor model</a:t>
             </a:r>
             <a:endParaRPr lang="en-US" dirty="0">
               <a:latin typeface="Calibri"/>
@@ -4531,10 +4502,6 @@
               </a:rPr>
               <a:t>invalid operation</a:t>
             </a:r>
-            <a:endParaRPr lang="en-US" sz="2200" dirty="0" smtClean="0">
-              <a:latin typeface="Consolas"/>
-              <a:cs typeface="Consolas"/>
-            </a:endParaRPr>
           </a:p>
           <a:p>
             <a:pPr marL="342900" indent="-342900">
@@ -4568,18 +4535,18 @@
   <p:clrMapOvr>
     <a:masterClrMapping/>
   </p:clrMapOvr>
-  <mc:AlternateContent xmlns:mc="http://schemas.openxmlformats.org/markup-compatibility/2006" xmlns:p14="http://schemas.microsoft.com/office/powerpoint/2010/main">
-    <mc:Choice Requires="p14">
+  <mc:AlternateContent xmlns:mc="http://schemas.openxmlformats.org/markup-compatibility/2006">
+    <mc:Choice xmlns:p14="http://schemas.microsoft.com/office/powerpoint/2010/main" Requires="p14">
       <p:transition p14:dur="0"/>
     </mc:Choice>
-    <mc:Fallback xmlns="">
-      <p:transition xmlns:p14="http://schemas.microsoft.com/office/powerpoint/2010/main"/>
+    <mc:Fallback>
+      <p:transition/>
     </mc:Fallback>
   </mc:AlternateContent>
   <p:timing>
     <p:tnLst>
       <p:par>
-        <p:cTn xmlns:p14="http://schemas.microsoft.com/office/powerpoint/2010/main" id="1" dur="indefinite" restart="never" nodeType="tmRoot"/>
+        <p:cTn id="1" dur="indefinite" restart="never" nodeType="tmRoot"/>
       </p:par>
     </p:tnLst>
   </p:timing>
@@ -4740,22 +4707,18 @@
   <p:clrMapOvr>
     <a:masterClrMapping/>
   </p:clrMapOvr>
-  <mc:AlternateContent xmlns:mc="http://schemas.openxmlformats.org/markup-compatibility/2006" xmlns:p14="http://schemas.microsoft.com/office/powerpoint/2010/main">
-    <mc:Choice Requires="p14">
-      <p:transition spd="slow" p14:dur="3400">
-        <p14:reveal/>
-      </p:transition>
+  <mc:AlternateContent xmlns:mc="http://schemas.openxmlformats.org/markup-compatibility/2006">
+    <mc:Choice xmlns:p14="http://schemas.microsoft.com/office/powerpoint/2010/main" Requires="p14">
+      <p:transition p14:dur="0"/>
     </mc:Choice>
-    <mc:Fallback xmlns="">
-      <p:transition xmlns:p14="http://schemas.microsoft.com/office/powerpoint/2010/main" spd="slow">
-        <p:fade/>
-      </p:transition>
+    <mc:Fallback>
+      <p:transition/>
     </mc:Fallback>
   </mc:AlternateContent>
   <p:timing>
     <p:tnLst>
       <p:par>
-        <p:cTn xmlns:p14="http://schemas.microsoft.com/office/powerpoint/2010/main" id="1" dur="indefinite" restart="never" nodeType="tmRoot"/>
+        <p:cTn id="1" dur="indefinite" restart="never" nodeType="tmRoot"/>
       </p:par>
     </p:tnLst>
   </p:timing>
@@ -4842,14 +4805,7 @@
                 <a:latin typeface="Calibri"/>
                 <a:cs typeface="Calibri"/>
               </a:rPr>
-              <a:t> data </a:t>
-            </a:r>
-            <a:r>
-              <a:rPr lang="en-US" sz="2500" dirty="0" smtClean="0">
-                <a:latin typeface="Calibri"/>
-                <a:cs typeface="Calibri"/>
-              </a:rPr>
-              <a:t>type</a:t>
+              <a:t> data type</a:t>
             </a:r>
           </a:p>
           <a:p>
@@ -4951,28 +4907,7 @@
                 <a:latin typeface="Calibri"/>
                 <a:cs typeface="Calibri"/>
               </a:rPr>
-              <a:t> @</a:t>
-            </a:r>
-            <a:r>
-              <a:rPr lang="en-US" sz="2500" dirty="0" smtClean="0">
-                <a:latin typeface="Calibri"/>
-                <a:cs typeface="Calibri"/>
-              </a:rPr>
-              <a:t>m’, </a:t>
-            </a:r>
-            <a:r>
-              <a:rPr lang="en-US" sz="2500" dirty="0" smtClean="0">
-                <a:latin typeface="Calibri"/>
-                <a:cs typeface="Calibri"/>
-              </a:rPr>
-              <a:t>“Not me </a:t>
-            </a:r>
-            <a:r>
-              <a:rPr lang="en-US" sz="2500" dirty="0" smtClean="0">
-                <a:latin typeface="Calibri"/>
-                <a:cs typeface="Calibri"/>
-              </a:rPr>
-              <a:t>though”</a:t>
+              <a:t> @m’, “Not me though”</a:t>
             </a:r>
           </a:p>
         </p:txBody>
@@ -4987,18 +4922,18 @@
   <p:clrMapOvr>
     <a:masterClrMapping/>
   </p:clrMapOvr>
-  <mc:AlternateContent xmlns:mc="http://schemas.openxmlformats.org/markup-compatibility/2006" xmlns:p14="http://schemas.microsoft.com/office/powerpoint/2010/main">
-    <mc:Choice Requires="p14">
+  <mc:AlternateContent xmlns:mc="http://schemas.openxmlformats.org/markup-compatibility/2006">
+    <mc:Choice xmlns:p14="http://schemas.microsoft.com/office/powerpoint/2010/main" Requires="p14">
       <p:transition p14:dur="0"/>
     </mc:Choice>
-    <mc:Fallback xmlns="">
-      <p:transition xmlns:p14="http://schemas.microsoft.com/office/powerpoint/2010/main"/>
+    <mc:Fallback>
+      <p:transition/>
     </mc:Fallback>
   </mc:AlternateContent>
   <p:timing>
     <p:tnLst>
       <p:par>
-        <p:cTn xmlns:p14="http://schemas.microsoft.com/office/powerpoint/2010/main" id="1" dur="indefinite" restart="never" nodeType="tmRoot"/>
+        <p:cTn id="1" dur="indefinite" restart="never" nodeType="tmRoot"/>
       </p:par>
     </p:tnLst>
   </p:timing>
@@ -5135,12 +5070,12 @@
   <p:clrMapOvr>
     <a:masterClrMapping/>
   </p:clrMapOvr>
-  <mc:AlternateContent xmlns:mc="http://schemas.openxmlformats.org/markup-compatibility/2006" xmlns:p14="http://schemas.microsoft.com/office/powerpoint/2010/main">
-    <mc:Choice Requires="p14">
+  <mc:AlternateContent xmlns:mc="http://schemas.openxmlformats.org/markup-compatibility/2006">
+    <mc:Choice xmlns:p14="http://schemas.microsoft.com/office/powerpoint/2010/main" Requires="p14">
       <p:transition p14:dur="0"/>
     </mc:Choice>
-    <mc:Fallback xmlns="">
-      <p:transition xmlns:p14="http://schemas.microsoft.com/office/powerpoint/2010/main"/>
+    <mc:Fallback>
+      <p:transition/>
     </mc:Fallback>
   </mc:AlternateContent>
 </p:sld>
@@ -5559,18 +5494,18 @@
   <p:clrMapOvr>
     <a:masterClrMapping/>
   </p:clrMapOvr>
-  <mc:AlternateContent xmlns:mc="http://schemas.openxmlformats.org/markup-compatibility/2006" xmlns:p14="http://schemas.microsoft.com/office/powerpoint/2010/main">
-    <mc:Choice Requires="p14">
+  <mc:AlternateContent xmlns:mc="http://schemas.openxmlformats.org/markup-compatibility/2006">
+    <mc:Choice xmlns:p14="http://schemas.microsoft.com/office/powerpoint/2010/main" Requires="p14">
       <p:transition p14:dur="0"/>
     </mc:Choice>
-    <mc:Fallback xmlns="">
-      <p:transition xmlns:p14="http://schemas.microsoft.com/office/powerpoint/2010/main"/>
+    <mc:Fallback>
+      <p:transition/>
     </mc:Fallback>
   </mc:AlternateContent>
   <p:timing>
     <p:tnLst>
       <p:par>
-        <p:cTn xmlns:p14="http://schemas.microsoft.com/office/powerpoint/2010/main" id="1" dur="indefinite" restart="never" nodeType="tmRoot"/>
+        <p:cTn id="1" dur="indefinite" restart="never" nodeType="tmRoot"/>
       </p:par>
     </p:tnLst>
   </p:timing>
@@ -5998,18 +5933,18 @@
   <p:clrMapOvr>
     <a:masterClrMapping/>
   </p:clrMapOvr>
-  <mc:AlternateContent xmlns:mc="http://schemas.openxmlformats.org/markup-compatibility/2006" xmlns:p14="http://schemas.microsoft.com/office/powerpoint/2010/main">
-    <mc:Choice Requires="p14">
+  <mc:AlternateContent xmlns:mc="http://schemas.openxmlformats.org/markup-compatibility/2006">
+    <mc:Choice xmlns:p14="http://schemas.microsoft.com/office/powerpoint/2010/main" Requires="p14">
       <p:transition p14:dur="0"/>
     </mc:Choice>
-    <mc:Fallback xmlns="">
-      <p:transition xmlns:p14="http://schemas.microsoft.com/office/powerpoint/2010/main"/>
+    <mc:Fallback>
+      <p:transition/>
     </mc:Fallback>
   </mc:AlternateContent>
   <p:timing>
     <p:tnLst>
       <p:par>
-        <p:cTn xmlns:p14="http://schemas.microsoft.com/office/powerpoint/2010/main" id="1" dur="indefinite" restart="never" nodeType="tmRoot"/>
+        <p:cTn id="1" dur="indefinite" restart="never" nodeType="tmRoot"/>
       </p:par>
     </p:tnLst>
   </p:timing>
@@ -6243,18 +6178,18 @@
   <p:clrMapOvr>
     <a:masterClrMapping/>
   </p:clrMapOvr>
-  <mc:AlternateContent xmlns:mc="http://schemas.openxmlformats.org/markup-compatibility/2006" xmlns:p14="http://schemas.microsoft.com/office/powerpoint/2010/main">
-    <mc:Choice Requires="p14">
+  <mc:AlternateContent xmlns:mc="http://schemas.openxmlformats.org/markup-compatibility/2006">
+    <mc:Choice xmlns:p14="http://schemas.microsoft.com/office/powerpoint/2010/main" Requires="p14">
       <p:transition p14:dur="0"/>
     </mc:Choice>
-    <mc:Fallback xmlns="">
-      <p:transition xmlns:p14="http://schemas.microsoft.com/office/powerpoint/2010/main"/>
+    <mc:Fallback>
+      <p:transition/>
     </mc:Fallback>
   </mc:AlternateContent>
   <p:timing>
     <p:tnLst>
       <p:par>
-        <p:cTn xmlns:p14="http://schemas.microsoft.com/office/powerpoint/2010/main" id="1" dur="indefinite" restart="never" nodeType="tmRoot"/>
+        <p:cTn id="1" dur="indefinite" restart="never" nodeType="tmRoot"/>
       </p:par>
     </p:tnLst>
   </p:timing>

</xml_diff>